<commit_message>
0709: member&alumni info updated
</commit_message>
<xml_diff>
--- a/assets/img/members/member_template.pptx
+++ b/assets/img/members/member_template.pptx
@@ -197,7 +197,7 @@
           <a:p>
             <a:fld id="{E628AAC4-EF3D-4399-ADBF-CCB864C2C04D}" type="datetimeFigureOut">
               <a:rPr lang="ko-KR" altLang="en-US" smtClean="0"/>
-              <a:t>2025. 2. 21.</a:t>
+              <a:t>2025-07-09</a:t>
             </a:fld>
             <a:endParaRPr lang="ko-KR" altLang="en-US" dirty="0"/>
           </a:p>
@@ -611,7 +611,7 @@
           <a:p>
             <a:fld id="{75F2F651-36CF-4C58-93DF-887A107CEA47}" type="datetimeFigureOut">
               <a:rPr lang="ko-KR" altLang="en-US" smtClean="0"/>
-              <a:t>2025. 2. 21.</a:t>
+              <a:t>2025-07-09</a:t>
             </a:fld>
             <a:endParaRPr lang="ko-KR" altLang="en-US" dirty="0"/>
           </a:p>
@@ -809,7 +809,7 @@
           <a:p>
             <a:fld id="{75F2F651-36CF-4C58-93DF-887A107CEA47}" type="datetimeFigureOut">
               <a:rPr lang="ko-KR" altLang="en-US" smtClean="0"/>
-              <a:t>2025. 2. 21.</a:t>
+              <a:t>2025-07-09</a:t>
             </a:fld>
             <a:endParaRPr lang="ko-KR" altLang="en-US" dirty="0"/>
           </a:p>
@@ -1017,7 +1017,7 @@
           <a:p>
             <a:fld id="{75F2F651-36CF-4C58-93DF-887A107CEA47}" type="datetimeFigureOut">
               <a:rPr lang="ko-KR" altLang="en-US" smtClean="0"/>
-              <a:t>2025. 2. 21.</a:t>
+              <a:t>2025-07-09</a:t>
             </a:fld>
             <a:endParaRPr lang="ko-KR" altLang="en-US" dirty="0"/>
           </a:p>
@@ -1215,7 +1215,7 @@
           <a:p>
             <a:fld id="{75F2F651-36CF-4C58-93DF-887A107CEA47}" type="datetimeFigureOut">
               <a:rPr lang="ko-KR" altLang="en-US" smtClean="0"/>
-              <a:t>2025. 2. 21.</a:t>
+              <a:t>2025-07-09</a:t>
             </a:fld>
             <a:endParaRPr lang="ko-KR" altLang="en-US" dirty="0"/>
           </a:p>
@@ -1490,7 +1490,7 @@
           <a:p>
             <a:fld id="{75F2F651-36CF-4C58-93DF-887A107CEA47}" type="datetimeFigureOut">
               <a:rPr lang="ko-KR" altLang="en-US" smtClean="0"/>
-              <a:t>2025. 2. 21.</a:t>
+              <a:t>2025-07-09</a:t>
             </a:fld>
             <a:endParaRPr lang="ko-KR" altLang="en-US" dirty="0"/>
           </a:p>
@@ -1755,7 +1755,7 @@
           <a:p>
             <a:fld id="{75F2F651-36CF-4C58-93DF-887A107CEA47}" type="datetimeFigureOut">
               <a:rPr lang="ko-KR" altLang="en-US" smtClean="0"/>
-              <a:t>2025. 2. 21.</a:t>
+              <a:t>2025-07-09</a:t>
             </a:fld>
             <a:endParaRPr lang="ko-KR" altLang="en-US" dirty="0"/>
           </a:p>
@@ -2167,7 +2167,7 @@
           <a:p>
             <a:fld id="{75F2F651-36CF-4C58-93DF-887A107CEA47}" type="datetimeFigureOut">
               <a:rPr lang="ko-KR" altLang="en-US" smtClean="0"/>
-              <a:t>2025. 2. 21.</a:t>
+              <a:t>2025-07-09</a:t>
             </a:fld>
             <a:endParaRPr lang="ko-KR" altLang="en-US" dirty="0"/>
           </a:p>
@@ -2308,7 +2308,7 @@
           <a:p>
             <a:fld id="{75F2F651-36CF-4C58-93DF-887A107CEA47}" type="datetimeFigureOut">
               <a:rPr lang="ko-KR" altLang="en-US" smtClean="0"/>
-              <a:t>2025. 2. 21.</a:t>
+              <a:t>2025-07-09</a:t>
             </a:fld>
             <a:endParaRPr lang="ko-KR" altLang="en-US" dirty="0"/>
           </a:p>
@@ -2421,7 +2421,7 @@
           <a:p>
             <a:fld id="{75F2F651-36CF-4C58-93DF-887A107CEA47}" type="datetimeFigureOut">
               <a:rPr lang="ko-KR" altLang="en-US" smtClean="0"/>
-              <a:t>2025. 2. 21.</a:t>
+              <a:t>2025-07-09</a:t>
             </a:fld>
             <a:endParaRPr lang="ko-KR" altLang="en-US" dirty="0"/>
           </a:p>
@@ -2732,7 +2732,7 @@
           <a:p>
             <a:fld id="{75F2F651-36CF-4C58-93DF-887A107CEA47}" type="datetimeFigureOut">
               <a:rPr lang="ko-KR" altLang="en-US" smtClean="0"/>
-              <a:t>2025. 2. 21.</a:t>
+              <a:t>2025-07-09</a:t>
             </a:fld>
             <a:endParaRPr lang="ko-KR" altLang="en-US" dirty="0"/>
           </a:p>
@@ -3020,7 +3020,7 @@
           <a:p>
             <a:fld id="{75F2F651-36CF-4C58-93DF-887A107CEA47}" type="datetimeFigureOut">
               <a:rPr lang="ko-KR" altLang="en-US" smtClean="0"/>
-              <a:t>2025. 2. 21.</a:t>
+              <a:t>2025-07-09</a:t>
             </a:fld>
             <a:endParaRPr lang="ko-KR" altLang="en-US" dirty="0"/>
           </a:p>
@@ -3261,7 +3261,7 @@
           <a:p>
             <a:fld id="{75F2F651-36CF-4C58-93DF-887A107CEA47}" type="datetimeFigureOut">
               <a:rPr lang="ko-KR" altLang="en-US" smtClean="0"/>
-              <a:t>2025. 2. 21.</a:t>
+              <a:t>2025-07-09</a:t>
             </a:fld>
             <a:endParaRPr lang="ko-KR" altLang="en-US" dirty="0"/>
           </a:p>
@@ -3692,8 +3692,8 @@
         </p:nvSpPr>
         <p:spPr>
           <a:xfrm>
-            <a:off x="2657894" y="1810173"/>
-            <a:ext cx="6941820" cy="3619500"/>
+            <a:off x="1803375" y="850790"/>
+            <a:ext cx="8585250" cy="4936692"/>
           </a:xfrm>
           <a:prstGeom prst="roundRect">
             <a:avLst/>
@@ -3720,292 +3720,338 @@
           <a:lstStyle/>
           <a:p>
             <a:pPr algn="ctr"/>
-            <a:endParaRPr lang="ko-KR" altLang="en-US" dirty="0"/>
-          </a:p>
-        </p:txBody>
-      </p:sp>
-      <p:sp>
-        <p:nvSpPr>
-          <p:cNvPr id="13" name="직사각형 12">
-            <a:extLst>
-              <a:ext uri="{FF2B5EF4-FFF2-40B4-BE49-F238E27FC236}">
-                <a16:creationId xmlns:a16="http://schemas.microsoft.com/office/drawing/2014/main" id="{0CFE1D2E-6F94-4C1D-BC51-683F31654D4F}"/>
-              </a:ext>
-            </a:extLst>
-          </p:cNvPr>
-          <p:cNvSpPr/>
+            <a:endParaRPr lang="ko-KR" altLang="en-US" b="1" dirty="0"/>
+          </a:p>
+        </p:txBody>
+      </p:sp>
+      <p:grpSp>
+        <p:nvGrpSpPr>
+          <p:cNvPr id="22" name="그룹 21">
+            <a:extLst>
+              <a:ext uri="{FF2B5EF4-FFF2-40B4-BE49-F238E27FC236}">
+                <a16:creationId xmlns:a16="http://schemas.microsoft.com/office/drawing/2014/main" id="{2238F007-9A05-8B82-B8D3-08B74BC380F3}"/>
+              </a:ext>
+            </a:extLst>
+          </p:cNvPr>
+          <p:cNvGrpSpPr/>
           <p:nvPr/>
-        </p:nvSpPr>
-        <p:spPr>
+        </p:nvGrpSpPr>
+        <p:grpSpPr>
           <a:xfrm>
             <a:off x="3326969" y="2212383"/>
             <a:ext cx="5603671" cy="2433234"/>
+            <a:chOff x="3326969" y="2212383"/>
+            <a:chExt cx="5603671" cy="2433234"/>
           </a:xfrm>
-          <a:prstGeom prst="rect">
-            <a:avLst/>
-          </a:prstGeom>
-          <a:solidFill>
-            <a:schemeClr val="bg1"/>
-          </a:solidFill>
-          <a:ln>
-            <a:noFill/>
-          </a:ln>
-        </p:spPr>
-        <p:style>
-          <a:lnRef idx="2">
-            <a:schemeClr val="accent1">
-              <a:shade val="50000"/>
-            </a:schemeClr>
-          </a:lnRef>
-          <a:fillRef idx="1">
-            <a:schemeClr val="accent1"/>
-          </a:fillRef>
-          <a:effectRef idx="0">
-            <a:schemeClr val="accent1"/>
-          </a:effectRef>
-          <a:fontRef idx="minor">
-            <a:schemeClr val="lt1"/>
-          </a:fontRef>
-        </p:style>
-        <p:txBody>
-          <a:bodyPr rtlCol="0" anchor="ctr"/>
-          <a:lstStyle/>
-          <a:p>
-            <a:pPr algn="ctr"/>
-            <a:endParaRPr lang="ko-KR" altLang="en-US">
-              <a:latin typeface="JejuGothicOTF" panose="02000300000000000000" pitchFamily="2" charset="-127"/>
-              <a:ea typeface="JejuGothicOTF" panose="02000300000000000000" pitchFamily="2" charset="-127"/>
-            </a:endParaRPr>
-          </a:p>
-        </p:txBody>
-      </p:sp>
-      <p:sp>
-        <p:nvSpPr>
-          <p:cNvPr id="15" name="TextBox 14">
-            <a:extLst>
-              <a:ext uri="{FF2B5EF4-FFF2-40B4-BE49-F238E27FC236}">
-                <a16:creationId xmlns:a16="http://schemas.microsoft.com/office/drawing/2014/main" id="{9B0E7F6D-013B-4051-90CB-8569B4396DAE}"/>
-              </a:ext>
-            </a:extLst>
-          </p:cNvPr>
-          <p:cNvSpPr txBox="1"/>
-          <p:nvPr/>
-        </p:nvSpPr>
-        <p:spPr>
-          <a:xfrm>
-            <a:off x="3540662" y="4024687"/>
-            <a:ext cx="1164101" cy="307777"/>
-          </a:xfrm>
-          <a:prstGeom prst="rect">
-            <a:avLst/>
-          </a:prstGeom>
-          <a:solidFill>
-            <a:schemeClr val="bg1"/>
-          </a:solidFill>
-        </p:spPr>
-        <p:txBody>
-          <a:bodyPr wrap="none" rtlCol="0">
-            <a:spAutoFit/>
-          </a:bodyPr>
-          <a:lstStyle/>
-          <a:p>
-            <a:pPr algn="ctr"/>
-            <a:r>
-              <a:rPr lang="ko-KR" altLang="en-US" sz="1400" dirty="0">
+        </p:grpSpPr>
+        <p:sp>
+          <p:nvSpPr>
+            <p:cNvPr id="13" name="직사각형 12">
+              <a:extLst>
+                <a:ext uri="{FF2B5EF4-FFF2-40B4-BE49-F238E27FC236}">
+                  <a16:creationId xmlns:a16="http://schemas.microsoft.com/office/drawing/2014/main" id="{0CFE1D2E-6F94-4C1D-BC51-683F31654D4F}"/>
+                </a:ext>
+              </a:extLst>
+            </p:cNvPr>
+            <p:cNvSpPr/>
+            <p:nvPr/>
+          </p:nvSpPr>
+          <p:spPr>
+            <a:xfrm>
+              <a:off x="3326969" y="2212383"/>
+              <a:ext cx="5603671" cy="2433234"/>
+            </a:xfrm>
+            <a:prstGeom prst="rect">
+              <a:avLst/>
+            </a:prstGeom>
+            <a:solidFill>
+              <a:schemeClr val="bg1"/>
+            </a:solidFill>
+            <a:ln>
+              <a:noFill/>
+            </a:ln>
+          </p:spPr>
+          <p:style>
+            <a:lnRef idx="2">
+              <a:schemeClr val="accent1">
+                <a:shade val="50000"/>
+              </a:schemeClr>
+            </a:lnRef>
+            <a:fillRef idx="1">
+              <a:schemeClr val="accent1"/>
+            </a:fillRef>
+            <a:effectRef idx="0">
+              <a:schemeClr val="accent1"/>
+            </a:effectRef>
+            <a:fontRef idx="minor">
+              <a:schemeClr val="lt1"/>
+            </a:fontRef>
+          </p:style>
+          <p:txBody>
+            <a:bodyPr rtlCol="0" anchor="ctr"/>
+            <a:lstStyle/>
+            <a:p>
+              <a:pPr algn="ctr"/>
+              <a:endParaRPr lang="ko-KR" altLang="en-US" b="1">
                 <a:latin typeface="JejuGothicOTF" panose="02000300000000000000" pitchFamily="2" charset="-127"/>
                 <a:ea typeface="JejuGothicOTF" panose="02000300000000000000" pitchFamily="2" charset="-127"/>
-              </a:rPr>
-              <a:t>성명 </a:t>
-            </a:r>
-            <a:r>
-              <a:rPr lang="en-US" altLang="ko-KR" sz="1400" dirty="0">
+              </a:endParaRPr>
+            </a:p>
+          </p:txBody>
+        </p:sp>
+        <p:sp>
+          <p:nvSpPr>
+            <p:cNvPr id="15" name="TextBox 14">
+              <a:extLst>
+                <a:ext uri="{FF2B5EF4-FFF2-40B4-BE49-F238E27FC236}">
+                  <a16:creationId xmlns:a16="http://schemas.microsoft.com/office/drawing/2014/main" id="{9B0E7F6D-013B-4051-90CB-8569B4396DAE}"/>
+                </a:ext>
+              </a:extLst>
+            </p:cNvPr>
+            <p:cNvSpPr txBox="1"/>
+            <p:nvPr/>
+          </p:nvSpPr>
+          <p:spPr>
+            <a:xfrm>
+              <a:off x="3495779" y="4024687"/>
+              <a:ext cx="1253869" cy="307777"/>
+            </a:xfrm>
+            <a:prstGeom prst="rect">
+              <a:avLst/>
+            </a:prstGeom>
+            <a:solidFill>
+              <a:schemeClr val="bg1"/>
+            </a:solidFill>
+          </p:spPr>
+          <p:txBody>
+            <a:bodyPr wrap="none" rtlCol="0">
+              <a:spAutoFit/>
+            </a:bodyPr>
+            <a:lstStyle/>
+            <a:p>
+              <a:pPr algn="ctr"/>
+              <a:r>
+                <a:rPr lang="ko-KR" altLang="en-US" sz="1400" b="1" dirty="0">
+                  <a:latin typeface="JejuGothicOTF" panose="02000300000000000000" pitchFamily="2" charset="-127"/>
+                  <a:ea typeface="JejuGothicOTF" panose="02000300000000000000" pitchFamily="2" charset="-127"/>
+                </a:rPr>
+                <a:t>성명 </a:t>
+              </a:r>
+              <a:r>
+                <a:rPr lang="en-US" altLang="ko-KR" sz="1400" b="1" dirty="0">
+                  <a:latin typeface="JejuGothicOTF" panose="02000300000000000000" pitchFamily="2" charset="-127"/>
+                  <a:ea typeface="JejuGothicOTF" panose="02000300000000000000" pitchFamily="2" charset="-127"/>
+                </a:rPr>
+                <a:t>: </a:t>
+              </a:r>
+              <a:r>
+                <a:rPr lang="ko-KR" altLang="en-US" sz="1400" b="1" dirty="0">
+                  <a:latin typeface="JejuGothicOTF" panose="02000300000000000000" pitchFamily="2" charset="-127"/>
+                  <a:ea typeface="JejuGothicOTF" panose="02000300000000000000" pitchFamily="2" charset="-127"/>
+                </a:rPr>
+                <a:t>이서영</a:t>
+              </a:r>
+            </a:p>
+          </p:txBody>
+        </p:sp>
+        <p:sp>
+          <p:nvSpPr>
+            <p:cNvPr id="2" name="TextBox 1">
+              <a:extLst>
+                <a:ext uri="{FF2B5EF4-FFF2-40B4-BE49-F238E27FC236}">
+                  <a16:creationId xmlns:a16="http://schemas.microsoft.com/office/drawing/2014/main" id="{92B72583-6DB4-E9C5-BC91-5A2D4CC4D221}"/>
+                </a:ext>
+              </a:extLst>
+            </p:cNvPr>
+            <p:cNvSpPr txBox="1"/>
+            <p:nvPr/>
+          </p:nvSpPr>
+          <p:spPr>
+            <a:xfrm>
+              <a:off x="4898140" y="2577981"/>
+              <a:ext cx="4017203" cy="1600438"/>
+            </a:xfrm>
+            <a:prstGeom prst="rect">
+              <a:avLst/>
+            </a:prstGeom>
+            <a:solidFill>
+              <a:schemeClr val="bg1"/>
+            </a:solidFill>
+          </p:spPr>
+          <p:txBody>
+            <a:bodyPr wrap="square" rtlCol="0">
+              <a:spAutoFit/>
+            </a:bodyPr>
+            <a:lstStyle/>
+            <a:p>
+              <a:pPr marL="285750" indent="-285750">
+                <a:buFont typeface="Arial" panose="020B0604020202020204" pitchFamily="34" charset="0"/>
+                <a:buChar char="•"/>
+              </a:pPr>
+              <a:r>
+                <a:rPr lang="ko-KR" altLang="en-US" sz="1400" b="1" dirty="0">
+                  <a:latin typeface="JejuGothicOTF" panose="02000300000000000000" pitchFamily="2" charset="-127"/>
+                  <a:ea typeface="JejuGothicOTF" panose="02000300000000000000" pitchFamily="2" charset="-127"/>
+                </a:rPr>
+                <a:t>현      재 </a:t>
+              </a:r>
+              <a:r>
+                <a:rPr lang="en-US" altLang="ko-KR" sz="1400" b="1" dirty="0">
+                  <a:latin typeface="JejuGothicOTF" panose="02000300000000000000" pitchFamily="2" charset="-127"/>
+                  <a:ea typeface="JejuGothicOTF" panose="02000300000000000000" pitchFamily="2" charset="-127"/>
+                </a:rPr>
+                <a:t>: </a:t>
+              </a:r>
+              <a:r>
+                <a:rPr lang="ko-KR" altLang="en-US" sz="1400" b="1" dirty="0">
+                  <a:latin typeface="JejuGothicOTF" panose="02000300000000000000" pitchFamily="2" charset="-127"/>
+                  <a:ea typeface="JejuGothicOTF" panose="02000300000000000000" pitchFamily="2" charset="-127"/>
+                </a:rPr>
+                <a:t>학부과정</a:t>
+              </a:r>
+              <a:endParaRPr lang="en-US" altLang="ko-KR" sz="1400" b="1" dirty="0">
                 <a:latin typeface="JejuGothicOTF" panose="02000300000000000000" pitchFamily="2" charset="-127"/>
                 <a:ea typeface="JejuGothicOTF" panose="02000300000000000000" pitchFamily="2" charset="-127"/>
-              </a:rPr>
-              <a:t>: </a:t>
-            </a:r>
-            <a:r>
-              <a:rPr lang="ko-KR" altLang="en-US" sz="1400" dirty="0">
+              </a:endParaRPr>
+            </a:p>
+            <a:p>
+              <a:pPr marL="285750" indent="-285750">
+                <a:buFont typeface="Arial" panose="020B0604020202020204" pitchFamily="34" charset="0"/>
+                <a:buChar char="•"/>
+              </a:pPr>
+              <a:endParaRPr lang="en-US" altLang="ko-KR" sz="1400" b="1" dirty="0">
                 <a:latin typeface="JejuGothicOTF" panose="02000300000000000000" pitchFamily="2" charset="-127"/>
                 <a:ea typeface="JejuGothicOTF" panose="02000300000000000000" pitchFamily="2" charset="-127"/>
-              </a:rPr>
-              <a:t>이준희</a:t>
-            </a:r>
-          </a:p>
-        </p:txBody>
-      </p:sp>
-      <p:sp>
-        <p:nvSpPr>
-          <p:cNvPr id="2" name="TextBox 1">
-            <a:extLst>
-              <a:ext uri="{FF2B5EF4-FFF2-40B4-BE49-F238E27FC236}">
-                <a16:creationId xmlns:a16="http://schemas.microsoft.com/office/drawing/2014/main" id="{92B72583-6DB4-E9C5-BC91-5A2D4CC4D221}"/>
-              </a:ext>
-            </a:extLst>
-          </p:cNvPr>
-          <p:cNvSpPr txBox="1"/>
-          <p:nvPr/>
-        </p:nvSpPr>
-        <p:spPr>
-          <a:xfrm>
-            <a:off x="4898140" y="2577981"/>
-            <a:ext cx="4017203" cy="1600438"/>
-          </a:xfrm>
-          <a:prstGeom prst="rect">
-            <a:avLst/>
-          </a:prstGeom>
-          <a:solidFill>
-            <a:schemeClr val="bg1"/>
-          </a:solidFill>
-        </p:spPr>
-        <p:txBody>
-          <a:bodyPr wrap="square" rtlCol="0">
-            <a:spAutoFit/>
-          </a:bodyPr>
-          <a:lstStyle/>
-          <a:p>
-            <a:pPr marL="285750" indent="-285750">
-              <a:buFont typeface="Arial" panose="020B0604020202020204" pitchFamily="34" charset="0"/>
-              <a:buChar char="•"/>
-            </a:pPr>
-            <a:r>
-              <a:rPr lang="ko-KR" altLang="en-US" sz="1400" dirty="0">
+              </a:endParaRPr>
+            </a:p>
+            <a:p>
+              <a:pPr marL="285750" indent="-285750">
+                <a:buFont typeface="Arial" panose="020B0604020202020204" pitchFamily="34" charset="0"/>
+                <a:buChar char="•"/>
+              </a:pPr>
+              <a:r>
+                <a:rPr lang="ko-KR" altLang="en-US" sz="1400" b="1" dirty="0">
+                  <a:latin typeface="JejuGothicOTF" panose="02000300000000000000" pitchFamily="2" charset="-127"/>
+                  <a:ea typeface="JejuGothicOTF" panose="02000300000000000000" pitchFamily="2" charset="-127"/>
+                </a:rPr>
+                <a:t>관심분야 </a:t>
+              </a:r>
+              <a:r>
+                <a:rPr lang="en-US" altLang="ko-KR" sz="1400" b="1" dirty="0">
+                  <a:latin typeface="JejuGothicOTF" panose="02000300000000000000" pitchFamily="2" charset="-127"/>
+                  <a:ea typeface="JejuGothicOTF" panose="02000300000000000000" pitchFamily="2" charset="-127"/>
+                </a:rPr>
+                <a:t>: Natural</a:t>
+              </a:r>
+              <a:r>
+                <a:rPr lang="ko-KR" altLang="en-US" sz="1400" b="1" dirty="0">
+                  <a:latin typeface="JejuGothicOTF" panose="02000300000000000000" pitchFamily="2" charset="-127"/>
+                  <a:ea typeface="JejuGothicOTF" panose="02000300000000000000" pitchFamily="2" charset="-127"/>
+                </a:rPr>
+                <a:t> </a:t>
+              </a:r>
+              <a:r>
+                <a:rPr lang="en-US" altLang="ko-KR" sz="1400" b="1" dirty="0">
+                  <a:latin typeface="JejuGothicOTF" panose="02000300000000000000" pitchFamily="2" charset="-127"/>
+                  <a:ea typeface="JejuGothicOTF" panose="02000300000000000000" pitchFamily="2" charset="-127"/>
+                </a:rPr>
+                <a:t>Language</a:t>
+              </a:r>
+              <a:r>
+                <a:rPr lang="ko-KR" altLang="en-US" sz="1400" b="1" dirty="0">
+                  <a:latin typeface="JejuGothicOTF" panose="02000300000000000000" pitchFamily="2" charset="-127"/>
+                  <a:ea typeface="JejuGothicOTF" panose="02000300000000000000" pitchFamily="2" charset="-127"/>
+                </a:rPr>
+                <a:t> </a:t>
+              </a:r>
+              <a:r>
+                <a:rPr lang="en-US" altLang="ko-KR" sz="1400" b="1" dirty="0">
+                  <a:latin typeface="JejuGothicOTF" panose="02000300000000000000" pitchFamily="2" charset="-127"/>
+                  <a:ea typeface="JejuGothicOTF" panose="02000300000000000000" pitchFamily="2" charset="-127"/>
+                </a:rPr>
+                <a:t>Processing</a:t>
+              </a:r>
+              <a:br>
+                <a:rPr lang="en-US" altLang="ko-KR" sz="1400" b="1" dirty="0">
+                  <a:latin typeface="JejuGothicOTF" panose="02000300000000000000" pitchFamily="2" charset="-127"/>
+                  <a:ea typeface="JejuGothicOTF" panose="02000300000000000000" pitchFamily="2" charset="-127"/>
+                </a:rPr>
+              </a:br>
+              <a:endParaRPr lang="en-US" altLang="ko-KR" sz="1400" b="1" dirty="0">
                 <a:latin typeface="JejuGothicOTF" panose="02000300000000000000" pitchFamily="2" charset="-127"/>
                 <a:ea typeface="JejuGothicOTF" panose="02000300000000000000" pitchFamily="2" charset="-127"/>
-              </a:rPr>
-              <a:t>현      재 </a:t>
-            </a:r>
-            <a:r>
-              <a:rPr lang="en-US" altLang="ko-KR" sz="1400" dirty="0">
+              </a:endParaRPr>
+            </a:p>
+            <a:p>
+              <a:pPr marL="285750" indent="-285750">
+                <a:buFont typeface="Arial" panose="020B0604020202020204" pitchFamily="34" charset="0"/>
+                <a:buChar char="•"/>
+              </a:pPr>
+              <a:r>
+                <a:rPr lang="en-US" altLang="ko-KR" sz="1400" b="1" dirty="0">
+                  <a:latin typeface="JejuGothicOTF" panose="02000300000000000000" pitchFamily="2" charset="-127"/>
+                  <a:ea typeface="JejuGothicOTF" panose="02000300000000000000" pitchFamily="2" charset="-127"/>
+                </a:rPr>
+                <a:t> E-mail  : sy951020@gmail.com</a:t>
+              </a:r>
+            </a:p>
+            <a:p>
+              <a:pPr marL="285750" indent="-285750">
+                <a:buFont typeface="Arial" panose="020B0604020202020204" pitchFamily="34" charset="0"/>
+                <a:buChar char="•"/>
+              </a:pPr>
+              <a:endParaRPr lang="en-US" altLang="ko-KR" sz="1400" b="1" dirty="0">
                 <a:latin typeface="JejuGothicOTF" panose="02000300000000000000" pitchFamily="2" charset="-127"/>
                 <a:ea typeface="JejuGothicOTF" panose="02000300000000000000" pitchFamily="2" charset="-127"/>
-              </a:rPr>
-              <a:t>: </a:t>
-            </a:r>
-            <a:r>
-              <a:rPr lang="ko-KR" altLang="en-US" sz="1400" dirty="0">
+              </a:endParaRPr>
+            </a:p>
+            <a:p>
+              <a:pPr marL="285750" indent="-285750">
+                <a:buFont typeface="Arial" panose="020B0604020202020204" pitchFamily="34" charset="0"/>
+                <a:buChar char="•"/>
+              </a:pPr>
+              <a:r>
+                <a:rPr lang="ko-KR" altLang="en-US" sz="1400" b="1" dirty="0">
+                  <a:latin typeface="JejuGothicOTF" panose="02000300000000000000" pitchFamily="2" charset="-127"/>
+                  <a:ea typeface="JejuGothicOTF" panose="02000300000000000000" pitchFamily="2" charset="-127"/>
+                </a:rPr>
+                <a:t>홈페이지</a:t>
+              </a:r>
+              <a:r>
+                <a:rPr lang="en-US" altLang="ko-KR" sz="1400" b="1" dirty="0">
+                  <a:latin typeface="JejuGothicOTF" panose="02000300000000000000" pitchFamily="2" charset="-127"/>
+                  <a:ea typeface="JejuGothicOTF" panose="02000300000000000000" pitchFamily="2" charset="-127"/>
+                </a:rPr>
+                <a:t>: </a:t>
+              </a:r>
+              <a:r>
+                <a:rPr lang="en-US" altLang="ko-KR" sz="1300" b="1" dirty="0">
+                  <a:latin typeface="JejuGothicOTF" panose="02000300000000000000" pitchFamily="2" charset="-127"/>
+                  <a:ea typeface="JejuGothicOTF" panose="02000300000000000000" pitchFamily="2" charset="-127"/>
+                </a:rPr>
+                <a:t>https://github.</a:t>
+              </a:r>
+              <a:r>
+                <a:rPr lang="en-US" altLang="ko-KR" sz="1300" b="1">
+                  <a:latin typeface="JejuGothicOTF" panose="02000300000000000000" pitchFamily="2" charset="-127"/>
+                  <a:ea typeface="JejuGothicOTF" panose="02000300000000000000" pitchFamily="2" charset="-127"/>
+                </a:rPr>
+                <a:t>com/sksy930</a:t>
+              </a:r>
+              <a:endParaRPr lang="en-US" altLang="ko-KR" sz="1300" b="1" dirty="0">
                 <a:latin typeface="JejuGothicOTF" panose="02000300000000000000" pitchFamily="2" charset="-127"/>
                 <a:ea typeface="JejuGothicOTF" panose="02000300000000000000" pitchFamily="2" charset="-127"/>
-              </a:rPr>
-              <a:t>석박사통합과정</a:t>
-            </a:r>
-            <a:endParaRPr lang="en-US" altLang="ko-KR" sz="1400" dirty="0">
-              <a:latin typeface="JejuGothicOTF" panose="02000300000000000000" pitchFamily="2" charset="-127"/>
-              <a:ea typeface="JejuGothicOTF" panose="02000300000000000000" pitchFamily="2" charset="-127"/>
-            </a:endParaRPr>
-          </a:p>
-          <a:p>
-            <a:pPr marL="285750" indent="-285750">
-              <a:buFont typeface="Arial" panose="020B0604020202020204" pitchFamily="34" charset="0"/>
-              <a:buChar char="•"/>
-            </a:pPr>
-            <a:endParaRPr lang="en-US" altLang="ko-KR" sz="1400" dirty="0">
-              <a:latin typeface="JejuGothicOTF" panose="02000300000000000000" pitchFamily="2" charset="-127"/>
-              <a:ea typeface="JejuGothicOTF" panose="02000300000000000000" pitchFamily="2" charset="-127"/>
-            </a:endParaRPr>
-          </a:p>
-          <a:p>
-            <a:pPr marL="285750" indent="-285750">
-              <a:buFont typeface="Arial" panose="020B0604020202020204" pitchFamily="34" charset="0"/>
-              <a:buChar char="•"/>
-            </a:pPr>
-            <a:r>
-              <a:rPr lang="ko-KR" altLang="en-US" sz="1400" dirty="0">
-                <a:latin typeface="JejuGothicOTF" panose="02000300000000000000" pitchFamily="2" charset="-127"/>
-                <a:ea typeface="JejuGothicOTF" panose="02000300000000000000" pitchFamily="2" charset="-127"/>
-              </a:rPr>
-              <a:t>관심분야 </a:t>
-            </a:r>
-            <a:r>
-              <a:rPr lang="en-US" altLang="ko-KR" sz="1400" dirty="0">
-                <a:latin typeface="JejuGothicOTF" panose="02000300000000000000" pitchFamily="2" charset="-127"/>
-                <a:ea typeface="JejuGothicOTF" panose="02000300000000000000" pitchFamily="2" charset="-127"/>
-              </a:rPr>
-              <a:t>: Natural Language Processing</a:t>
-            </a:r>
-            <a:br>
-              <a:rPr lang="en-US" altLang="ko-KR" sz="1400" dirty="0">
-                <a:latin typeface="JejuGothicOTF" panose="02000300000000000000" pitchFamily="2" charset="-127"/>
-                <a:ea typeface="JejuGothicOTF" panose="02000300000000000000" pitchFamily="2" charset="-127"/>
-              </a:rPr>
-            </a:br>
-            <a:endParaRPr lang="en-US" altLang="ko-KR" sz="1400" dirty="0">
-              <a:latin typeface="JejuGothicOTF" panose="02000300000000000000" pitchFamily="2" charset="-127"/>
-              <a:ea typeface="JejuGothicOTF" panose="02000300000000000000" pitchFamily="2" charset="-127"/>
-            </a:endParaRPr>
-          </a:p>
-          <a:p>
-            <a:pPr marL="285750" indent="-285750">
-              <a:buFont typeface="Arial" panose="020B0604020202020204" pitchFamily="34" charset="0"/>
-              <a:buChar char="•"/>
-            </a:pPr>
-            <a:r>
-              <a:rPr lang="en-US" altLang="ko-KR" sz="1400" dirty="0">
-                <a:latin typeface="JejuGothicOTF" panose="02000300000000000000" pitchFamily="2" charset="-127"/>
-                <a:ea typeface="JejuGothicOTF" panose="02000300000000000000" pitchFamily="2" charset="-127"/>
-              </a:rPr>
-              <a:t> E-mail  : ljh010110@g.skku.edu</a:t>
-            </a:r>
-          </a:p>
-          <a:p>
-            <a:pPr marL="285750" indent="-285750">
-              <a:buFont typeface="Arial" panose="020B0604020202020204" pitchFamily="34" charset="0"/>
-              <a:buChar char="•"/>
-            </a:pPr>
-            <a:endParaRPr lang="en-US" altLang="ko-KR" sz="1400" dirty="0">
-              <a:latin typeface="JejuGothicOTF" panose="02000300000000000000" pitchFamily="2" charset="-127"/>
-              <a:ea typeface="JejuGothicOTF" panose="02000300000000000000" pitchFamily="2" charset="-127"/>
-            </a:endParaRPr>
-          </a:p>
-          <a:p>
-            <a:pPr marL="285750" indent="-285750">
-              <a:buFont typeface="Arial" panose="020B0604020202020204" pitchFamily="34" charset="0"/>
-              <a:buChar char="•"/>
-            </a:pPr>
-            <a:r>
-              <a:rPr lang="ko-KR" altLang="en-US" sz="1400" dirty="0">
-                <a:latin typeface="JejuGothicOTF" panose="02000300000000000000" pitchFamily="2" charset="-127"/>
-                <a:ea typeface="JejuGothicOTF" panose="02000300000000000000" pitchFamily="2" charset="-127"/>
-              </a:rPr>
-              <a:t>홈페이지</a:t>
-            </a:r>
-            <a:r>
-              <a:rPr lang="en-US" altLang="ko-KR" sz="1400" dirty="0">
-                <a:latin typeface="JejuGothicOTF" panose="02000300000000000000" pitchFamily="2" charset="-127"/>
-                <a:ea typeface="JejuGothicOTF" panose="02000300000000000000" pitchFamily="2" charset="-127"/>
-              </a:rPr>
-              <a:t>: </a:t>
-            </a:r>
-            <a:r>
-              <a:rPr lang="en-US" altLang="ko-KR" sz="1100" dirty="0">
-                <a:latin typeface="JejuGothicOTF" panose="02000300000000000000" pitchFamily="2" charset="-127"/>
-                <a:ea typeface="JejuGothicOTF" panose="02000300000000000000" pitchFamily="2" charset="-127"/>
-              </a:rPr>
-              <a:t>https://</a:t>
-            </a:r>
-            <a:r>
-              <a:rPr lang="en-US" altLang="ko-KR" sz="1100" dirty="0" err="1">
-                <a:latin typeface="JejuGothicOTF" panose="02000300000000000000" pitchFamily="2" charset="-127"/>
-                <a:ea typeface="JejuGothicOTF" panose="02000300000000000000" pitchFamily="2" charset="-127"/>
-              </a:rPr>
-              <a:t>github.com</a:t>
-            </a:r>
-            <a:r>
-              <a:rPr lang="en-US" altLang="ko-KR" sz="1100" dirty="0">
-                <a:latin typeface="JejuGothicOTF" panose="02000300000000000000" pitchFamily="2" charset="-127"/>
-                <a:ea typeface="JejuGothicOTF" panose="02000300000000000000" pitchFamily="2" charset="-127"/>
-              </a:rPr>
-              <a:t>/ljh010110-skku-edu</a:t>
-            </a:r>
-          </a:p>
-        </p:txBody>
-      </p:sp>
+              </a:endParaRPr>
+            </a:p>
+          </p:txBody>
+        </p:sp>
+      </p:grpSp>
       <p:pic>
         <p:nvPicPr>
-          <p:cNvPr id="3" name="Picture 2">
-            <a:extLst>
-              <a:ext uri="{FF2B5EF4-FFF2-40B4-BE49-F238E27FC236}">
-                <a16:creationId xmlns:a16="http://schemas.microsoft.com/office/drawing/2014/main" id="{D80DCE2F-9C5F-0383-9EAD-6463D1E55A7F}"/>
+          <p:cNvPr id="24" name="그림 23" descr="인간의 얼굴, 사람, 입술, 의류이(가) 표시된 사진&#10;&#10;AI 생성 콘텐츠는 정확하지 않을 수 있습니다.">
+            <a:extLst>
+              <a:ext uri="{FF2B5EF4-FFF2-40B4-BE49-F238E27FC236}">
+                <a16:creationId xmlns:a16="http://schemas.microsoft.com/office/drawing/2014/main" id="{D4998FA8-17C3-F6DA-4181-0F02F272ECD5}"/>
               </a:ext>
             </a:extLst>
           </p:cNvPr>
@@ -4015,15 +4061,21 @@
           <p:nvPr/>
         </p:nvPicPr>
         <p:blipFill>
-          <a:blip r:embed="rId2"/>
+          <a:blip r:embed="rId2">
+            <a:extLst>
+              <a:ext uri="{28A0092B-C50C-407E-A947-70E740481C1C}">
+                <a14:useLocalDpi xmlns:a14="http://schemas.microsoft.com/office/drawing/2010/main" val="0"/>
+              </a:ext>
+            </a:extLst>
+          </a:blip>
           <a:stretch>
             <a:fillRect/>
           </a:stretch>
         </p:blipFill>
         <p:spPr>
           <a:xfrm>
-            <a:off x="3523863" y="2417367"/>
-            <a:ext cx="1174803" cy="1507070"/>
+            <a:off x="3515911" y="2413863"/>
+            <a:ext cx="1164101" cy="1507070"/>
           </a:xfrm>
           <a:prstGeom prst="rect">
             <a:avLst/>

</xml_diff>

<commit_message>
0827: member info updated
</commit_message>
<xml_diff>
--- a/assets/img/members/member_template.pptx
+++ b/assets/img/members/member_template.pptx
@@ -5,10 +5,15 @@
     <p:sldMasterId id="2147483648" r:id="rId1"/>
   </p:sldMasterIdLst>
   <p:notesMasterIdLst>
-    <p:notesMasterId r:id="rId3"/>
+    <p:notesMasterId r:id="rId8"/>
   </p:notesMasterIdLst>
   <p:sldIdLst>
-    <p:sldId id="258" r:id="rId2"/>
+    <p:sldId id="263" r:id="rId2"/>
+    <p:sldId id="259" r:id="rId3"/>
+    <p:sldId id="260" r:id="rId4"/>
+    <p:sldId id="261" r:id="rId5"/>
+    <p:sldId id="258" r:id="rId6"/>
+    <p:sldId id="262" r:id="rId7"/>
   </p:sldIdLst>
   <p:sldSz cx="12192000" cy="6858000"/>
   <p:notesSz cx="6858000" cy="9144000"/>
@@ -197,7 +202,7 @@
           <a:p>
             <a:fld id="{E628AAC4-EF3D-4399-ADBF-CCB864C2C04D}" type="datetimeFigureOut">
               <a:rPr lang="ko-KR" altLang="en-US" smtClean="0"/>
-              <a:t>2025-07-09</a:t>
+              <a:t>2025-08-27</a:t>
             </a:fld>
             <a:endParaRPr lang="ko-KR" altLang="en-US" dirty="0"/>
           </a:p>
@@ -611,7 +616,7 @@
           <a:p>
             <a:fld id="{75F2F651-36CF-4C58-93DF-887A107CEA47}" type="datetimeFigureOut">
               <a:rPr lang="ko-KR" altLang="en-US" smtClean="0"/>
-              <a:t>2025-07-09</a:t>
+              <a:t>2025-08-27</a:t>
             </a:fld>
             <a:endParaRPr lang="ko-KR" altLang="en-US" dirty="0"/>
           </a:p>
@@ -809,7 +814,7 @@
           <a:p>
             <a:fld id="{75F2F651-36CF-4C58-93DF-887A107CEA47}" type="datetimeFigureOut">
               <a:rPr lang="ko-KR" altLang="en-US" smtClean="0"/>
-              <a:t>2025-07-09</a:t>
+              <a:t>2025-08-27</a:t>
             </a:fld>
             <a:endParaRPr lang="ko-KR" altLang="en-US" dirty="0"/>
           </a:p>
@@ -1017,7 +1022,7 @@
           <a:p>
             <a:fld id="{75F2F651-36CF-4C58-93DF-887A107CEA47}" type="datetimeFigureOut">
               <a:rPr lang="ko-KR" altLang="en-US" smtClean="0"/>
-              <a:t>2025-07-09</a:t>
+              <a:t>2025-08-27</a:t>
             </a:fld>
             <a:endParaRPr lang="ko-KR" altLang="en-US" dirty="0"/>
           </a:p>
@@ -1215,7 +1220,7 @@
           <a:p>
             <a:fld id="{75F2F651-36CF-4C58-93DF-887A107CEA47}" type="datetimeFigureOut">
               <a:rPr lang="ko-KR" altLang="en-US" smtClean="0"/>
-              <a:t>2025-07-09</a:t>
+              <a:t>2025-08-27</a:t>
             </a:fld>
             <a:endParaRPr lang="ko-KR" altLang="en-US" dirty="0"/>
           </a:p>
@@ -1490,7 +1495,7 @@
           <a:p>
             <a:fld id="{75F2F651-36CF-4C58-93DF-887A107CEA47}" type="datetimeFigureOut">
               <a:rPr lang="ko-KR" altLang="en-US" smtClean="0"/>
-              <a:t>2025-07-09</a:t>
+              <a:t>2025-08-27</a:t>
             </a:fld>
             <a:endParaRPr lang="ko-KR" altLang="en-US" dirty="0"/>
           </a:p>
@@ -1755,7 +1760,7 @@
           <a:p>
             <a:fld id="{75F2F651-36CF-4C58-93DF-887A107CEA47}" type="datetimeFigureOut">
               <a:rPr lang="ko-KR" altLang="en-US" smtClean="0"/>
-              <a:t>2025-07-09</a:t>
+              <a:t>2025-08-27</a:t>
             </a:fld>
             <a:endParaRPr lang="ko-KR" altLang="en-US" dirty="0"/>
           </a:p>
@@ -2167,7 +2172,7 @@
           <a:p>
             <a:fld id="{75F2F651-36CF-4C58-93DF-887A107CEA47}" type="datetimeFigureOut">
               <a:rPr lang="ko-KR" altLang="en-US" smtClean="0"/>
-              <a:t>2025-07-09</a:t>
+              <a:t>2025-08-27</a:t>
             </a:fld>
             <a:endParaRPr lang="ko-KR" altLang="en-US" dirty="0"/>
           </a:p>
@@ -2308,7 +2313,7 @@
           <a:p>
             <a:fld id="{75F2F651-36CF-4C58-93DF-887A107CEA47}" type="datetimeFigureOut">
               <a:rPr lang="ko-KR" altLang="en-US" smtClean="0"/>
-              <a:t>2025-07-09</a:t>
+              <a:t>2025-08-27</a:t>
             </a:fld>
             <a:endParaRPr lang="ko-KR" altLang="en-US" dirty="0"/>
           </a:p>
@@ -2421,7 +2426,7 @@
           <a:p>
             <a:fld id="{75F2F651-36CF-4C58-93DF-887A107CEA47}" type="datetimeFigureOut">
               <a:rPr lang="ko-KR" altLang="en-US" smtClean="0"/>
-              <a:t>2025-07-09</a:t>
+              <a:t>2025-08-27</a:t>
             </a:fld>
             <a:endParaRPr lang="ko-KR" altLang="en-US" dirty="0"/>
           </a:p>
@@ -2732,7 +2737,7 @@
           <a:p>
             <a:fld id="{75F2F651-36CF-4C58-93DF-887A107CEA47}" type="datetimeFigureOut">
               <a:rPr lang="ko-KR" altLang="en-US" smtClean="0"/>
-              <a:t>2025-07-09</a:t>
+              <a:t>2025-08-27</a:t>
             </a:fld>
             <a:endParaRPr lang="ko-KR" altLang="en-US" dirty="0"/>
           </a:p>
@@ -3020,7 +3025,7 @@
           <a:p>
             <a:fld id="{75F2F651-36CF-4C58-93DF-887A107CEA47}" type="datetimeFigureOut">
               <a:rPr lang="ko-KR" altLang="en-US" smtClean="0"/>
-              <a:t>2025-07-09</a:t>
+              <a:t>2025-08-27</a:t>
             </a:fld>
             <a:endParaRPr lang="ko-KR" altLang="en-US" dirty="0"/>
           </a:p>
@@ -3261,7 +3266,7 @@
           <a:p>
             <a:fld id="{75F2F651-36CF-4C58-93DF-887A107CEA47}" type="datetimeFigureOut">
               <a:rPr lang="ko-KR" altLang="en-US" smtClean="0"/>
-              <a:t>2025-07-09</a:t>
+              <a:t>2025-08-27</a:t>
             </a:fld>
             <a:endParaRPr lang="ko-KR" altLang="en-US" dirty="0"/>
           </a:p>
@@ -3666,6 +3671,1773 @@
   <p:cSld>
     <p:spTree>
       <p:nvGrpSpPr>
+        <p:cNvPr id="1" name="">
+          <a:extLst>
+            <a:ext uri="{FF2B5EF4-FFF2-40B4-BE49-F238E27FC236}">
+              <a16:creationId xmlns:a16="http://schemas.microsoft.com/office/drawing/2014/main" id="{BCFBF61E-65ED-BC71-D394-34404BEC7B10}"/>
+            </a:ext>
+          </a:extLst>
+        </p:cNvPr>
+        <p:cNvGrpSpPr/>
+        <p:nvPr/>
+      </p:nvGrpSpPr>
+      <p:grpSpPr>
+        <a:xfrm>
+          <a:off x="0" y="0"/>
+          <a:ext cx="0" cy="0"/>
+          <a:chOff x="0" y="0"/>
+          <a:chExt cx="0" cy="0"/>
+        </a:xfrm>
+      </p:grpSpPr>
+      <p:sp>
+        <p:nvSpPr>
+          <p:cNvPr id="12" name="사각형: 둥근 모서리 11">
+            <a:extLst>
+              <a:ext uri="{FF2B5EF4-FFF2-40B4-BE49-F238E27FC236}">
+                <a16:creationId xmlns:a16="http://schemas.microsoft.com/office/drawing/2014/main" id="{41DCCE1F-3BCE-9E4B-88EF-F71C458BE838}"/>
+              </a:ext>
+            </a:extLst>
+          </p:cNvPr>
+          <p:cNvSpPr/>
+          <p:nvPr/>
+        </p:nvSpPr>
+        <p:spPr>
+          <a:xfrm>
+            <a:off x="1803375" y="850790"/>
+            <a:ext cx="8585250" cy="4936692"/>
+          </a:xfrm>
+          <a:prstGeom prst="roundRect">
+            <a:avLst/>
+          </a:prstGeom>
+        </p:spPr>
+        <p:style>
+          <a:lnRef idx="2">
+            <a:schemeClr val="accent1">
+              <a:shade val="50000"/>
+            </a:schemeClr>
+          </a:lnRef>
+          <a:fillRef idx="1">
+            <a:schemeClr val="accent1"/>
+          </a:fillRef>
+          <a:effectRef idx="0">
+            <a:schemeClr val="accent1"/>
+          </a:effectRef>
+          <a:fontRef idx="minor">
+            <a:schemeClr val="lt1"/>
+          </a:fontRef>
+        </p:style>
+        <p:txBody>
+          <a:bodyPr rtlCol="0" anchor="ctr"/>
+          <a:lstStyle/>
+          <a:p>
+            <a:pPr algn="ctr"/>
+            <a:endParaRPr lang="ko-KR" altLang="en-US" b="1" dirty="0"/>
+          </a:p>
+        </p:txBody>
+      </p:sp>
+      <p:grpSp>
+        <p:nvGrpSpPr>
+          <p:cNvPr id="6" name="그룹 5">
+            <a:extLst>
+              <a:ext uri="{FF2B5EF4-FFF2-40B4-BE49-F238E27FC236}">
+                <a16:creationId xmlns:a16="http://schemas.microsoft.com/office/drawing/2014/main" id="{D3567A7E-4492-35FE-A56D-D4480EF8765C}"/>
+              </a:ext>
+            </a:extLst>
+          </p:cNvPr>
+          <p:cNvGrpSpPr/>
+          <p:nvPr/>
+        </p:nvGrpSpPr>
+        <p:grpSpPr>
+          <a:xfrm>
+            <a:off x="3326969" y="2212383"/>
+            <a:ext cx="5603671" cy="2433234"/>
+            <a:chOff x="3326969" y="2212383"/>
+            <a:chExt cx="5603671" cy="2433234"/>
+          </a:xfrm>
+        </p:grpSpPr>
+        <p:grpSp>
+          <p:nvGrpSpPr>
+            <p:cNvPr id="22" name="그룹 21">
+              <a:extLst>
+                <a:ext uri="{FF2B5EF4-FFF2-40B4-BE49-F238E27FC236}">
+                  <a16:creationId xmlns:a16="http://schemas.microsoft.com/office/drawing/2014/main" id="{C4B0CDB2-24D2-8DD8-5C73-6E54F082FF7C}"/>
+                </a:ext>
+              </a:extLst>
+            </p:cNvPr>
+            <p:cNvGrpSpPr/>
+            <p:nvPr/>
+          </p:nvGrpSpPr>
+          <p:grpSpPr>
+            <a:xfrm>
+              <a:off x="3326969" y="2212383"/>
+              <a:ext cx="5603671" cy="2433234"/>
+              <a:chOff x="3326969" y="2212383"/>
+              <a:chExt cx="5603671" cy="2433234"/>
+            </a:xfrm>
+          </p:grpSpPr>
+          <p:sp>
+            <p:nvSpPr>
+              <p:cNvPr id="13" name="직사각형 12">
+                <a:extLst>
+                  <a:ext uri="{FF2B5EF4-FFF2-40B4-BE49-F238E27FC236}">
+                    <a16:creationId xmlns:a16="http://schemas.microsoft.com/office/drawing/2014/main" id="{759F364B-81C4-C2BE-0C38-7A5F9BCDD389}"/>
+                  </a:ext>
+                </a:extLst>
+              </p:cNvPr>
+              <p:cNvSpPr/>
+              <p:nvPr/>
+            </p:nvSpPr>
+            <p:spPr>
+              <a:xfrm>
+                <a:off x="3326969" y="2212383"/>
+                <a:ext cx="5603671" cy="2433234"/>
+              </a:xfrm>
+              <a:prstGeom prst="rect">
+                <a:avLst/>
+              </a:prstGeom>
+              <a:solidFill>
+                <a:schemeClr val="bg1"/>
+              </a:solidFill>
+              <a:ln>
+                <a:noFill/>
+              </a:ln>
+            </p:spPr>
+            <p:style>
+              <a:lnRef idx="2">
+                <a:schemeClr val="accent1">
+                  <a:shade val="50000"/>
+                </a:schemeClr>
+              </a:lnRef>
+              <a:fillRef idx="1">
+                <a:schemeClr val="accent1"/>
+              </a:fillRef>
+              <a:effectRef idx="0">
+                <a:schemeClr val="accent1"/>
+              </a:effectRef>
+              <a:fontRef idx="minor">
+                <a:schemeClr val="lt1"/>
+              </a:fontRef>
+            </p:style>
+            <p:txBody>
+              <a:bodyPr rtlCol="0" anchor="ctr"/>
+              <a:lstStyle/>
+              <a:p>
+                <a:pPr algn="ctr"/>
+                <a:endParaRPr lang="ko-KR" altLang="en-US" b="1">
+                  <a:latin typeface="JejuGothicOTF" panose="02000300000000000000" pitchFamily="2" charset="-127"/>
+                  <a:ea typeface="JejuGothicOTF" panose="02000300000000000000" pitchFamily="2" charset="-127"/>
+                </a:endParaRPr>
+              </a:p>
+            </p:txBody>
+          </p:sp>
+          <p:sp>
+            <p:nvSpPr>
+              <p:cNvPr id="15" name="TextBox 14">
+                <a:extLst>
+                  <a:ext uri="{FF2B5EF4-FFF2-40B4-BE49-F238E27FC236}">
+                    <a16:creationId xmlns:a16="http://schemas.microsoft.com/office/drawing/2014/main" id="{F89F31E4-A009-07A6-6F8F-9AC945C75A26}"/>
+                  </a:ext>
+                </a:extLst>
+              </p:cNvPr>
+              <p:cNvSpPr txBox="1"/>
+              <p:nvPr/>
+            </p:nvSpPr>
+            <p:spPr>
+              <a:xfrm>
+                <a:off x="3495780" y="4024687"/>
+                <a:ext cx="1253869" cy="307777"/>
+              </a:xfrm>
+              <a:prstGeom prst="rect">
+                <a:avLst/>
+              </a:prstGeom>
+              <a:solidFill>
+                <a:schemeClr val="bg1"/>
+              </a:solidFill>
+            </p:spPr>
+            <p:txBody>
+              <a:bodyPr wrap="none" rtlCol="0">
+                <a:spAutoFit/>
+              </a:bodyPr>
+              <a:lstStyle/>
+              <a:p>
+                <a:pPr algn="ctr"/>
+                <a:r>
+                  <a:rPr lang="ko-KR" altLang="en-US" sz="1400" b="1" dirty="0">
+                    <a:latin typeface="JejuGothicOTF" panose="02000300000000000000" pitchFamily="2" charset="-127"/>
+                    <a:ea typeface="JejuGothicOTF" panose="02000300000000000000" pitchFamily="2" charset="-127"/>
+                  </a:rPr>
+                  <a:t>성명 </a:t>
+                </a:r>
+                <a:r>
+                  <a:rPr lang="en-US" altLang="ko-KR" sz="1400" b="1" dirty="0">
+                    <a:latin typeface="JejuGothicOTF" panose="02000300000000000000" pitchFamily="2" charset="-127"/>
+                    <a:ea typeface="JejuGothicOTF" panose="02000300000000000000" pitchFamily="2" charset="-127"/>
+                  </a:rPr>
+                  <a:t>: </a:t>
+                </a:r>
+                <a:r>
+                  <a:rPr lang="ko-KR" altLang="en-US" sz="1400" b="1" dirty="0" err="1">
+                    <a:latin typeface="JejuGothicOTF" panose="02000300000000000000" pitchFamily="2" charset="-127"/>
+                    <a:ea typeface="JejuGothicOTF" panose="02000300000000000000" pitchFamily="2" charset="-127"/>
+                  </a:rPr>
+                  <a:t>이예원</a:t>
+                </a:r>
+                <a:endParaRPr lang="ko-KR" altLang="en-US" sz="1400" b="1" dirty="0">
+                  <a:latin typeface="JejuGothicOTF" panose="02000300000000000000" pitchFamily="2" charset="-127"/>
+                  <a:ea typeface="JejuGothicOTF" panose="02000300000000000000" pitchFamily="2" charset="-127"/>
+                </a:endParaRPr>
+              </a:p>
+            </p:txBody>
+          </p:sp>
+          <p:sp>
+            <p:nvSpPr>
+              <p:cNvPr id="2" name="TextBox 1">
+                <a:extLst>
+                  <a:ext uri="{FF2B5EF4-FFF2-40B4-BE49-F238E27FC236}">
+                    <a16:creationId xmlns:a16="http://schemas.microsoft.com/office/drawing/2014/main" id="{B3073183-AC71-2C7C-40F9-CC4BCC48F478}"/>
+                  </a:ext>
+                </a:extLst>
+              </p:cNvPr>
+              <p:cNvSpPr txBox="1"/>
+              <p:nvPr/>
+            </p:nvSpPr>
+            <p:spPr>
+              <a:xfrm>
+                <a:off x="4898140" y="2577981"/>
+                <a:ext cx="4017203" cy="1600438"/>
+              </a:xfrm>
+              <a:prstGeom prst="rect">
+                <a:avLst/>
+              </a:prstGeom>
+              <a:solidFill>
+                <a:schemeClr val="bg1"/>
+              </a:solidFill>
+            </p:spPr>
+            <p:txBody>
+              <a:bodyPr wrap="square" rtlCol="0">
+                <a:spAutoFit/>
+              </a:bodyPr>
+              <a:lstStyle/>
+              <a:p>
+                <a:pPr marL="285750" indent="-285750">
+                  <a:buFont typeface="Arial" panose="020B0604020202020204" pitchFamily="34" charset="0"/>
+                  <a:buChar char="•"/>
+                </a:pPr>
+                <a:r>
+                  <a:rPr lang="ko-KR" altLang="en-US" sz="1400" b="1" dirty="0">
+                    <a:latin typeface="JejuGothicOTF" panose="02000300000000000000" pitchFamily="2" charset="-127"/>
+                    <a:ea typeface="JejuGothicOTF" panose="02000300000000000000" pitchFamily="2" charset="-127"/>
+                  </a:rPr>
+                  <a:t>현      재 </a:t>
+                </a:r>
+                <a:r>
+                  <a:rPr lang="en-US" altLang="ko-KR" sz="1400" b="1" dirty="0">
+                    <a:latin typeface="JejuGothicOTF" panose="02000300000000000000" pitchFamily="2" charset="-127"/>
+                    <a:ea typeface="JejuGothicOTF" panose="02000300000000000000" pitchFamily="2" charset="-127"/>
+                  </a:rPr>
+                  <a:t>: </a:t>
+                </a:r>
+                <a:r>
+                  <a:rPr lang="ko-KR" altLang="en-US" sz="1400" b="1" dirty="0">
+                    <a:latin typeface="JejuGothicOTF" panose="02000300000000000000" pitchFamily="2" charset="-127"/>
+                    <a:ea typeface="JejuGothicOTF" panose="02000300000000000000" pitchFamily="2" charset="-127"/>
+                  </a:rPr>
+                  <a:t>석박사통합과정</a:t>
+                </a:r>
+                <a:endParaRPr lang="en-US" altLang="ko-KR" sz="1400" b="1" dirty="0">
+                  <a:latin typeface="JejuGothicOTF" panose="02000300000000000000" pitchFamily="2" charset="-127"/>
+                  <a:ea typeface="JejuGothicOTF" panose="02000300000000000000" pitchFamily="2" charset="-127"/>
+                </a:endParaRPr>
+              </a:p>
+              <a:p>
+                <a:pPr marL="285750" indent="-285750">
+                  <a:buFont typeface="Arial" panose="020B0604020202020204" pitchFamily="34" charset="0"/>
+                  <a:buChar char="•"/>
+                </a:pPr>
+                <a:endParaRPr lang="en-US" altLang="ko-KR" sz="1400" b="1" dirty="0">
+                  <a:latin typeface="JejuGothicOTF" panose="02000300000000000000" pitchFamily="2" charset="-127"/>
+                  <a:ea typeface="JejuGothicOTF" panose="02000300000000000000" pitchFamily="2" charset="-127"/>
+                </a:endParaRPr>
+              </a:p>
+              <a:p>
+                <a:pPr marL="285750" indent="-285750">
+                  <a:buFont typeface="Arial" panose="020B0604020202020204" pitchFamily="34" charset="0"/>
+                  <a:buChar char="•"/>
+                </a:pPr>
+                <a:r>
+                  <a:rPr lang="ko-KR" altLang="en-US" sz="1400" b="1" dirty="0">
+                    <a:latin typeface="JejuGothicOTF" panose="02000300000000000000" pitchFamily="2" charset="-127"/>
+                    <a:ea typeface="JejuGothicOTF" panose="02000300000000000000" pitchFamily="2" charset="-127"/>
+                  </a:rPr>
+                  <a:t>관심분야 </a:t>
+                </a:r>
+                <a:r>
+                  <a:rPr lang="en-US" altLang="ko-KR" sz="1400" b="1" dirty="0">
+                    <a:latin typeface="JejuGothicOTF" panose="02000300000000000000" pitchFamily="2" charset="-127"/>
+                    <a:ea typeface="JejuGothicOTF" panose="02000300000000000000" pitchFamily="2" charset="-127"/>
+                  </a:rPr>
+                  <a:t>: Dialogue System</a:t>
+                </a:r>
+                <a:br>
+                  <a:rPr lang="en-US" altLang="ko-KR" sz="1400" b="1" dirty="0">
+                    <a:latin typeface="JejuGothicOTF" panose="02000300000000000000" pitchFamily="2" charset="-127"/>
+                    <a:ea typeface="JejuGothicOTF" panose="02000300000000000000" pitchFamily="2" charset="-127"/>
+                  </a:rPr>
+                </a:br>
+                <a:endParaRPr lang="en-US" altLang="ko-KR" sz="1400" b="1" dirty="0">
+                  <a:latin typeface="JejuGothicOTF" panose="02000300000000000000" pitchFamily="2" charset="-127"/>
+                  <a:ea typeface="JejuGothicOTF" panose="02000300000000000000" pitchFamily="2" charset="-127"/>
+                </a:endParaRPr>
+              </a:p>
+              <a:p>
+                <a:pPr marL="285750" indent="-285750">
+                  <a:buFont typeface="Arial" panose="020B0604020202020204" pitchFamily="34" charset="0"/>
+                  <a:buChar char="•"/>
+                </a:pPr>
+                <a:r>
+                  <a:rPr lang="en-US" altLang="ko-KR" sz="1400" b="1" dirty="0">
+                    <a:latin typeface="JejuGothicOTF" panose="02000300000000000000" pitchFamily="2" charset="-127"/>
+                    <a:ea typeface="JejuGothicOTF" panose="02000300000000000000" pitchFamily="2" charset="-127"/>
+                  </a:rPr>
+                  <a:t> E-mail  : yewon0742@gmail.com</a:t>
+                </a:r>
+              </a:p>
+              <a:p>
+                <a:pPr marL="285750" indent="-285750">
+                  <a:buFont typeface="Arial" panose="020B0604020202020204" pitchFamily="34" charset="0"/>
+                  <a:buChar char="•"/>
+                </a:pPr>
+                <a:endParaRPr lang="en-US" altLang="ko-KR" sz="1400" b="1" dirty="0">
+                  <a:latin typeface="JejuGothicOTF" panose="02000300000000000000" pitchFamily="2" charset="-127"/>
+                  <a:ea typeface="JejuGothicOTF" panose="02000300000000000000" pitchFamily="2" charset="-127"/>
+                </a:endParaRPr>
+              </a:p>
+              <a:p>
+                <a:pPr marL="285750" indent="-285750">
+                  <a:buFont typeface="Arial" panose="020B0604020202020204" pitchFamily="34" charset="0"/>
+                  <a:buChar char="•"/>
+                </a:pPr>
+                <a:r>
+                  <a:rPr lang="ko-KR" altLang="en-US" sz="1400" b="1" dirty="0">
+                    <a:latin typeface="JejuGothicOTF" panose="02000300000000000000" pitchFamily="2" charset="-127"/>
+                    <a:ea typeface="JejuGothicOTF" panose="02000300000000000000" pitchFamily="2" charset="-127"/>
+                  </a:rPr>
+                  <a:t>홈페이지</a:t>
+                </a:r>
+                <a:r>
+                  <a:rPr lang="en-US" altLang="ko-KR" sz="1400" b="1" dirty="0">
+                    <a:latin typeface="JejuGothicOTF" panose="02000300000000000000" pitchFamily="2" charset="-127"/>
+                    <a:ea typeface="JejuGothicOTF" panose="02000300000000000000" pitchFamily="2" charset="-127"/>
+                  </a:rPr>
+                  <a:t>:</a:t>
+                </a:r>
+                <a:r>
+                  <a:rPr lang="en-US" altLang="ko-KR" sz="1200" b="1" dirty="0">
+                    <a:latin typeface="JejuGothicOTF" panose="02000300000000000000" pitchFamily="2" charset="-127"/>
+                    <a:ea typeface="JejuGothicOTF" panose="02000300000000000000" pitchFamily="2" charset="-127"/>
+                  </a:rPr>
+                  <a:t> https://github.com/aeongaewon</a:t>
+                </a:r>
+              </a:p>
+            </p:txBody>
+          </p:sp>
+        </p:grpSp>
+        <p:pic>
+          <p:nvPicPr>
+            <p:cNvPr id="4" name="그림 3" descr="의류, 인간의 얼굴, 사람, 인물사진이(가) 표시된 사진&#10;&#10;AI 생성 콘텐츠는 정확하지 않을 수 있습니다.">
+              <a:extLst>
+                <a:ext uri="{FF2B5EF4-FFF2-40B4-BE49-F238E27FC236}">
+                  <a16:creationId xmlns:a16="http://schemas.microsoft.com/office/drawing/2014/main" id="{DAAF2D5D-3FC7-52C0-325A-092AD3583C28}"/>
+                </a:ext>
+              </a:extLst>
+            </p:cNvPr>
+            <p:cNvPicPr>
+              <a:picLocks noChangeAspect="1"/>
+            </p:cNvPicPr>
+            <p:nvPr/>
+          </p:nvPicPr>
+          <p:blipFill>
+            <a:blip r:embed="rId2">
+              <a:extLst>
+                <a:ext uri="{28A0092B-C50C-407E-A947-70E740481C1C}">
+                  <a14:useLocalDpi xmlns:a14="http://schemas.microsoft.com/office/drawing/2010/main" val="0"/>
+                </a:ext>
+              </a:extLst>
+            </a:blip>
+            <a:stretch>
+              <a:fillRect/>
+            </a:stretch>
+          </p:blipFill>
+          <p:spPr>
+            <a:xfrm>
+              <a:off x="3509409" y="2312477"/>
+              <a:ext cx="1253869" cy="1612117"/>
+            </a:xfrm>
+            <a:prstGeom prst="rect">
+              <a:avLst/>
+            </a:prstGeom>
+          </p:spPr>
+        </p:pic>
+      </p:grpSp>
+    </p:spTree>
+    <p:extLst>
+      <p:ext uri="{BB962C8B-B14F-4D97-AF65-F5344CB8AC3E}">
+        <p14:creationId xmlns:p14="http://schemas.microsoft.com/office/powerpoint/2010/main" val="3056472559"/>
+      </p:ext>
+    </p:extLst>
+  </p:cSld>
+  <p:clrMapOvr>
+    <a:masterClrMapping/>
+  </p:clrMapOvr>
+</p:sld>
+</file>
+
+<file path=ppt/slides/slide2.xml><?xml version="1.0" encoding="utf-8"?>
+<p:sld xmlns:a="http://schemas.openxmlformats.org/drawingml/2006/main" xmlns:r="http://schemas.openxmlformats.org/officeDocument/2006/relationships" xmlns:p="http://schemas.openxmlformats.org/presentationml/2006/main">
+  <p:cSld>
+    <p:spTree>
+      <p:nvGrpSpPr>
+        <p:cNvPr id="1" name="">
+          <a:extLst>
+            <a:ext uri="{FF2B5EF4-FFF2-40B4-BE49-F238E27FC236}">
+              <a16:creationId xmlns:a16="http://schemas.microsoft.com/office/drawing/2014/main" id="{0AB245ED-1BA8-E43E-8BA3-BBD2F4170912}"/>
+            </a:ext>
+          </a:extLst>
+        </p:cNvPr>
+        <p:cNvGrpSpPr/>
+        <p:nvPr/>
+      </p:nvGrpSpPr>
+      <p:grpSpPr>
+        <a:xfrm>
+          <a:off x="0" y="0"/>
+          <a:ext cx="0" cy="0"/>
+          <a:chOff x="0" y="0"/>
+          <a:chExt cx="0" cy="0"/>
+        </a:xfrm>
+      </p:grpSpPr>
+      <p:sp>
+        <p:nvSpPr>
+          <p:cNvPr id="12" name="사각형: 둥근 모서리 11">
+            <a:extLst>
+              <a:ext uri="{FF2B5EF4-FFF2-40B4-BE49-F238E27FC236}">
+                <a16:creationId xmlns:a16="http://schemas.microsoft.com/office/drawing/2014/main" id="{103D5566-B4BE-1A9B-A623-8DE703A73349}"/>
+              </a:ext>
+            </a:extLst>
+          </p:cNvPr>
+          <p:cNvSpPr/>
+          <p:nvPr/>
+        </p:nvSpPr>
+        <p:spPr>
+          <a:xfrm>
+            <a:off x="1803375" y="850790"/>
+            <a:ext cx="8585250" cy="4936692"/>
+          </a:xfrm>
+          <a:prstGeom prst="roundRect">
+            <a:avLst/>
+          </a:prstGeom>
+        </p:spPr>
+        <p:style>
+          <a:lnRef idx="2">
+            <a:schemeClr val="accent1">
+              <a:shade val="50000"/>
+            </a:schemeClr>
+          </a:lnRef>
+          <a:fillRef idx="1">
+            <a:schemeClr val="accent1"/>
+          </a:fillRef>
+          <a:effectRef idx="0">
+            <a:schemeClr val="accent1"/>
+          </a:effectRef>
+          <a:fontRef idx="minor">
+            <a:schemeClr val="lt1"/>
+          </a:fontRef>
+        </p:style>
+        <p:txBody>
+          <a:bodyPr rtlCol="0" anchor="ctr"/>
+          <a:lstStyle/>
+          <a:p>
+            <a:pPr algn="ctr"/>
+            <a:endParaRPr lang="ko-KR" altLang="en-US" b="1" dirty="0"/>
+          </a:p>
+        </p:txBody>
+      </p:sp>
+      <p:grpSp>
+        <p:nvGrpSpPr>
+          <p:cNvPr id="7" name="그룹 6">
+            <a:extLst>
+              <a:ext uri="{FF2B5EF4-FFF2-40B4-BE49-F238E27FC236}">
+                <a16:creationId xmlns:a16="http://schemas.microsoft.com/office/drawing/2014/main" id="{41D2895D-FDA0-EB59-D836-DECAAF008FDC}"/>
+              </a:ext>
+            </a:extLst>
+          </p:cNvPr>
+          <p:cNvGrpSpPr/>
+          <p:nvPr/>
+        </p:nvGrpSpPr>
+        <p:grpSpPr>
+          <a:xfrm>
+            <a:off x="3326969" y="2212383"/>
+            <a:ext cx="5603671" cy="2433234"/>
+            <a:chOff x="3326969" y="2212383"/>
+            <a:chExt cx="5603671" cy="2433234"/>
+          </a:xfrm>
+        </p:grpSpPr>
+        <p:grpSp>
+          <p:nvGrpSpPr>
+            <p:cNvPr id="22" name="그룹 21">
+              <a:extLst>
+                <a:ext uri="{FF2B5EF4-FFF2-40B4-BE49-F238E27FC236}">
+                  <a16:creationId xmlns:a16="http://schemas.microsoft.com/office/drawing/2014/main" id="{F8BD54E9-7097-E32B-95D8-28F02BEA4599}"/>
+                </a:ext>
+              </a:extLst>
+            </p:cNvPr>
+            <p:cNvGrpSpPr/>
+            <p:nvPr/>
+          </p:nvGrpSpPr>
+          <p:grpSpPr>
+            <a:xfrm>
+              <a:off x="3326969" y="2212383"/>
+              <a:ext cx="5603671" cy="2433234"/>
+              <a:chOff x="3326969" y="2212383"/>
+              <a:chExt cx="5603671" cy="2433234"/>
+            </a:xfrm>
+          </p:grpSpPr>
+          <p:sp>
+            <p:nvSpPr>
+              <p:cNvPr id="13" name="직사각형 12">
+                <a:extLst>
+                  <a:ext uri="{FF2B5EF4-FFF2-40B4-BE49-F238E27FC236}">
+                    <a16:creationId xmlns:a16="http://schemas.microsoft.com/office/drawing/2014/main" id="{69271ABC-C217-4E26-5FCA-3B455ABC0BCE}"/>
+                  </a:ext>
+                </a:extLst>
+              </p:cNvPr>
+              <p:cNvSpPr/>
+              <p:nvPr/>
+            </p:nvSpPr>
+            <p:spPr>
+              <a:xfrm>
+                <a:off x="3326969" y="2212383"/>
+                <a:ext cx="5603671" cy="2433234"/>
+              </a:xfrm>
+              <a:prstGeom prst="rect">
+                <a:avLst/>
+              </a:prstGeom>
+              <a:solidFill>
+                <a:schemeClr val="bg1"/>
+              </a:solidFill>
+              <a:ln>
+                <a:noFill/>
+              </a:ln>
+            </p:spPr>
+            <p:style>
+              <a:lnRef idx="2">
+                <a:schemeClr val="accent1">
+                  <a:shade val="50000"/>
+                </a:schemeClr>
+              </a:lnRef>
+              <a:fillRef idx="1">
+                <a:schemeClr val="accent1"/>
+              </a:fillRef>
+              <a:effectRef idx="0">
+                <a:schemeClr val="accent1"/>
+              </a:effectRef>
+              <a:fontRef idx="minor">
+                <a:schemeClr val="lt1"/>
+              </a:fontRef>
+            </p:style>
+            <p:txBody>
+              <a:bodyPr rtlCol="0" anchor="ctr"/>
+              <a:lstStyle/>
+              <a:p>
+                <a:pPr algn="ctr"/>
+                <a:endParaRPr lang="ko-KR" altLang="en-US" b="1">
+                  <a:latin typeface="JejuGothicOTF" panose="02000300000000000000" pitchFamily="2" charset="-127"/>
+                  <a:ea typeface="JejuGothicOTF" panose="02000300000000000000" pitchFamily="2" charset="-127"/>
+                </a:endParaRPr>
+              </a:p>
+            </p:txBody>
+          </p:sp>
+          <p:sp>
+            <p:nvSpPr>
+              <p:cNvPr id="15" name="TextBox 14">
+                <a:extLst>
+                  <a:ext uri="{FF2B5EF4-FFF2-40B4-BE49-F238E27FC236}">
+                    <a16:creationId xmlns:a16="http://schemas.microsoft.com/office/drawing/2014/main" id="{DFE7AB3A-3106-5077-A499-345282D851DA}"/>
+                  </a:ext>
+                </a:extLst>
+              </p:cNvPr>
+              <p:cNvSpPr txBox="1"/>
+              <p:nvPr/>
+            </p:nvSpPr>
+            <p:spPr>
+              <a:xfrm>
+                <a:off x="3495779" y="4024687"/>
+                <a:ext cx="1253869" cy="307777"/>
+              </a:xfrm>
+              <a:prstGeom prst="rect">
+                <a:avLst/>
+              </a:prstGeom>
+              <a:solidFill>
+                <a:schemeClr val="bg1"/>
+              </a:solidFill>
+            </p:spPr>
+            <p:txBody>
+              <a:bodyPr wrap="none" rtlCol="0">
+                <a:spAutoFit/>
+              </a:bodyPr>
+              <a:lstStyle/>
+              <a:p>
+                <a:pPr algn="ctr"/>
+                <a:r>
+                  <a:rPr lang="ko-KR" altLang="en-US" sz="1400" b="1" dirty="0">
+                    <a:latin typeface="JejuGothicOTF" panose="02000300000000000000" pitchFamily="2" charset="-127"/>
+                    <a:ea typeface="JejuGothicOTF" panose="02000300000000000000" pitchFamily="2" charset="-127"/>
+                  </a:rPr>
+                  <a:t>성명 </a:t>
+                </a:r>
+                <a:r>
+                  <a:rPr lang="en-US" altLang="ko-KR" sz="1400" b="1" dirty="0">
+                    <a:latin typeface="JejuGothicOTF" panose="02000300000000000000" pitchFamily="2" charset="-127"/>
+                    <a:ea typeface="JejuGothicOTF" panose="02000300000000000000" pitchFamily="2" charset="-127"/>
+                  </a:rPr>
+                  <a:t>: </a:t>
+                </a:r>
+                <a:r>
+                  <a:rPr lang="ko-KR" altLang="en-US" sz="1400" b="1" dirty="0">
+                    <a:latin typeface="JejuGothicOTF" panose="02000300000000000000" pitchFamily="2" charset="-127"/>
+                    <a:ea typeface="JejuGothicOTF" panose="02000300000000000000" pitchFamily="2" charset="-127"/>
+                  </a:rPr>
+                  <a:t>김정우</a:t>
+                </a:r>
+              </a:p>
+            </p:txBody>
+          </p:sp>
+          <p:sp>
+            <p:nvSpPr>
+              <p:cNvPr id="2" name="TextBox 1">
+                <a:extLst>
+                  <a:ext uri="{FF2B5EF4-FFF2-40B4-BE49-F238E27FC236}">
+                    <a16:creationId xmlns:a16="http://schemas.microsoft.com/office/drawing/2014/main" id="{609B4386-EAF3-9A2F-4F8A-C92B8F72AF12}"/>
+                  </a:ext>
+                </a:extLst>
+              </p:cNvPr>
+              <p:cNvSpPr txBox="1"/>
+              <p:nvPr/>
+            </p:nvSpPr>
+            <p:spPr>
+              <a:xfrm>
+                <a:off x="4898140" y="2577981"/>
+                <a:ext cx="4017203" cy="1600438"/>
+              </a:xfrm>
+              <a:prstGeom prst="rect">
+                <a:avLst/>
+              </a:prstGeom>
+              <a:solidFill>
+                <a:schemeClr val="bg1"/>
+              </a:solidFill>
+            </p:spPr>
+            <p:txBody>
+              <a:bodyPr wrap="square" rtlCol="0">
+                <a:spAutoFit/>
+              </a:bodyPr>
+              <a:lstStyle/>
+              <a:p>
+                <a:pPr marL="285750" indent="-285750">
+                  <a:buFont typeface="Arial" panose="020B0604020202020204" pitchFamily="34" charset="0"/>
+                  <a:buChar char="•"/>
+                </a:pPr>
+                <a:r>
+                  <a:rPr lang="ko-KR" altLang="en-US" sz="1400" b="1" dirty="0">
+                    <a:latin typeface="JejuGothicOTF" panose="02000300000000000000" pitchFamily="2" charset="-127"/>
+                    <a:ea typeface="JejuGothicOTF" panose="02000300000000000000" pitchFamily="2" charset="-127"/>
+                  </a:rPr>
+                  <a:t>현      재 </a:t>
+                </a:r>
+                <a:r>
+                  <a:rPr lang="en-US" altLang="ko-KR" sz="1400" b="1" dirty="0">
+                    <a:latin typeface="JejuGothicOTF" panose="02000300000000000000" pitchFamily="2" charset="-127"/>
+                    <a:ea typeface="JejuGothicOTF" panose="02000300000000000000" pitchFamily="2" charset="-127"/>
+                  </a:rPr>
+                  <a:t>: </a:t>
+                </a:r>
+                <a:r>
+                  <a:rPr lang="ko-KR" altLang="en-US" sz="1400" b="1" dirty="0">
+                    <a:latin typeface="JejuGothicOTF" panose="02000300000000000000" pitchFamily="2" charset="-127"/>
+                    <a:ea typeface="JejuGothicOTF" panose="02000300000000000000" pitchFamily="2" charset="-127"/>
+                  </a:rPr>
+                  <a:t>학부과정</a:t>
+                </a:r>
+                <a:endParaRPr lang="en-US" altLang="ko-KR" sz="1400" b="1" dirty="0">
+                  <a:latin typeface="JejuGothicOTF" panose="02000300000000000000" pitchFamily="2" charset="-127"/>
+                  <a:ea typeface="JejuGothicOTF" panose="02000300000000000000" pitchFamily="2" charset="-127"/>
+                </a:endParaRPr>
+              </a:p>
+              <a:p>
+                <a:pPr marL="285750" indent="-285750">
+                  <a:buFont typeface="Arial" panose="020B0604020202020204" pitchFamily="34" charset="0"/>
+                  <a:buChar char="•"/>
+                </a:pPr>
+                <a:endParaRPr lang="en-US" altLang="ko-KR" sz="1400" b="1" dirty="0">
+                  <a:latin typeface="JejuGothicOTF" panose="02000300000000000000" pitchFamily="2" charset="-127"/>
+                  <a:ea typeface="JejuGothicOTF" panose="02000300000000000000" pitchFamily="2" charset="-127"/>
+                </a:endParaRPr>
+              </a:p>
+              <a:p>
+                <a:pPr marL="285750" indent="-285750">
+                  <a:buFont typeface="Arial" panose="020B0604020202020204" pitchFamily="34" charset="0"/>
+                  <a:buChar char="•"/>
+                </a:pPr>
+                <a:r>
+                  <a:rPr lang="ko-KR" altLang="en-US" sz="1400" b="1" dirty="0">
+                    <a:latin typeface="JejuGothicOTF" panose="02000300000000000000" pitchFamily="2" charset="-127"/>
+                    <a:ea typeface="JejuGothicOTF" panose="02000300000000000000" pitchFamily="2" charset="-127"/>
+                  </a:rPr>
+                  <a:t>관심분야 </a:t>
+                </a:r>
+                <a:r>
+                  <a:rPr lang="en-US" altLang="ko-KR" sz="1400" b="1" dirty="0">
+                    <a:latin typeface="JejuGothicOTF" panose="02000300000000000000" pitchFamily="2" charset="-127"/>
+                    <a:ea typeface="JejuGothicOTF" panose="02000300000000000000" pitchFamily="2" charset="-127"/>
+                  </a:rPr>
+                  <a:t>: Natural</a:t>
+                </a:r>
+                <a:r>
+                  <a:rPr lang="ko-KR" altLang="en-US" sz="1400" b="1" dirty="0">
+                    <a:latin typeface="JejuGothicOTF" panose="02000300000000000000" pitchFamily="2" charset="-127"/>
+                    <a:ea typeface="JejuGothicOTF" panose="02000300000000000000" pitchFamily="2" charset="-127"/>
+                  </a:rPr>
+                  <a:t> </a:t>
+                </a:r>
+                <a:r>
+                  <a:rPr lang="en-US" altLang="ko-KR" sz="1400" b="1" dirty="0">
+                    <a:latin typeface="JejuGothicOTF" panose="02000300000000000000" pitchFamily="2" charset="-127"/>
+                    <a:ea typeface="JejuGothicOTF" panose="02000300000000000000" pitchFamily="2" charset="-127"/>
+                  </a:rPr>
+                  <a:t>Language</a:t>
+                </a:r>
+                <a:r>
+                  <a:rPr lang="ko-KR" altLang="en-US" sz="1400" b="1" dirty="0">
+                    <a:latin typeface="JejuGothicOTF" panose="02000300000000000000" pitchFamily="2" charset="-127"/>
+                    <a:ea typeface="JejuGothicOTF" panose="02000300000000000000" pitchFamily="2" charset="-127"/>
+                  </a:rPr>
+                  <a:t> </a:t>
+                </a:r>
+                <a:r>
+                  <a:rPr lang="en-US" altLang="ko-KR" sz="1400" b="1" dirty="0">
+                    <a:latin typeface="JejuGothicOTF" panose="02000300000000000000" pitchFamily="2" charset="-127"/>
+                    <a:ea typeface="JejuGothicOTF" panose="02000300000000000000" pitchFamily="2" charset="-127"/>
+                  </a:rPr>
+                  <a:t>Processing</a:t>
+                </a:r>
+                <a:br>
+                  <a:rPr lang="en-US" altLang="ko-KR" sz="1400" b="1" dirty="0">
+                    <a:latin typeface="JejuGothicOTF" panose="02000300000000000000" pitchFamily="2" charset="-127"/>
+                    <a:ea typeface="JejuGothicOTF" panose="02000300000000000000" pitchFamily="2" charset="-127"/>
+                  </a:rPr>
+                </a:br>
+                <a:endParaRPr lang="en-US" altLang="ko-KR" sz="1400" b="1" dirty="0">
+                  <a:latin typeface="JejuGothicOTF" panose="02000300000000000000" pitchFamily="2" charset="-127"/>
+                  <a:ea typeface="JejuGothicOTF" panose="02000300000000000000" pitchFamily="2" charset="-127"/>
+                </a:endParaRPr>
+              </a:p>
+              <a:p>
+                <a:pPr marL="285750" indent="-285750">
+                  <a:buFont typeface="Arial" panose="020B0604020202020204" pitchFamily="34" charset="0"/>
+                  <a:buChar char="•"/>
+                </a:pPr>
+                <a:r>
+                  <a:rPr lang="en-US" altLang="ko-KR" sz="1400" b="1" dirty="0">
+                    <a:latin typeface="JejuGothicOTF" panose="02000300000000000000" pitchFamily="2" charset="-127"/>
+                    <a:ea typeface="JejuGothicOTF" panose="02000300000000000000" pitchFamily="2" charset="-127"/>
+                  </a:rPr>
+                  <a:t> E-mail  : jeongwu510@gmail.com</a:t>
+                </a:r>
+              </a:p>
+              <a:p>
+                <a:pPr marL="285750" indent="-285750">
+                  <a:buFont typeface="Arial" panose="020B0604020202020204" pitchFamily="34" charset="0"/>
+                  <a:buChar char="•"/>
+                </a:pPr>
+                <a:endParaRPr lang="en-US" altLang="ko-KR" sz="1400" b="1" dirty="0">
+                  <a:latin typeface="JejuGothicOTF" panose="02000300000000000000" pitchFamily="2" charset="-127"/>
+                  <a:ea typeface="JejuGothicOTF" panose="02000300000000000000" pitchFamily="2" charset="-127"/>
+                </a:endParaRPr>
+              </a:p>
+              <a:p>
+                <a:pPr marL="285750" indent="-285750">
+                  <a:buFont typeface="Arial" panose="020B0604020202020204" pitchFamily="34" charset="0"/>
+                  <a:buChar char="•"/>
+                </a:pPr>
+                <a:r>
+                  <a:rPr lang="ko-KR" altLang="en-US" sz="1400" b="1" dirty="0">
+                    <a:latin typeface="JejuGothicOTF" panose="02000300000000000000" pitchFamily="2" charset="-127"/>
+                    <a:ea typeface="JejuGothicOTF" panose="02000300000000000000" pitchFamily="2" charset="-127"/>
+                  </a:rPr>
+                  <a:t>홈페이지</a:t>
+                </a:r>
+                <a:r>
+                  <a:rPr lang="en-US" altLang="ko-KR" sz="1400" b="1" dirty="0">
+                    <a:latin typeface="JejuGothicOTF" panose="02000300000000000000" pitchFamily="2" charset="-127"/>
+                    <a:ea typeface="JejuGothicOTF" panose="02000300000000000000" pitchFamily="2" charset="-127"/>
+                  </a:rPr>
+                  <a:t>:</a:t>
+                </a:r>
+                <a:endParaRPr lang="en-US" altLang="ko-KR" sz="1300" b="1" dirty="0">
+                  <a:latin typeface="JejuGothicOTF" panose="02000300000000000000" pitchFamily="2" charset="-127"/>
+                  <a:ea typeface="JejuGothicOTF" panose="02000300000000000000" pitchFamily="2" charset="-127"/>
+                </a:endParaRPr>
+              </a:p>
+            </p:txBody>
+          </p:sp>
+        </p:grpSp>
+        <p:pic>
+          <p:nvPicPr>
+            <p:cNvPr id="6" name="그림 5" descr="인간의 얼굴, 사람, 입술, 의류이(가) 표시된 사진&#10;&#10;AI 생성 콘텐츠는 정확하지 않을 수 있습니다.">
+              <a:extLst>
+                <a:ext uri="{FF2B5EF4-FFF2-40B4-BE49-F238E27FC236}">
+                  <a16:creationId xmlns:a16="http://schemas.microsoft.com/office/drawing/2014/main" id="{D48712C5-DBA9-4A06-8A74-D8A08F286880}"/>
+                </a:ext>
+              </a:extLst>
+            </p:cNvPr>
+            <p:cNvPicPr>
+              <a:picLocks noChangeAspect="1"/>
+            </p:cNvPicPr>
+            <p:nvPr/>
+          </p:nvPicPr>
+          <p:blipFill>
+            <a:blip r:embed="rId2">
+              <a:extLst>
+                <a:ext uri="{28A0092B-C50C-407E-A947-70E740481C1C}">
+                  <a14:useLocalDpi xmlns:a14="http://schemas.microsoft.com/office/drawing/2010/main" val="0"/>
+                </a:ext>
+              </a:extLst>
+            </a:blip>
+            <a:stretch>
+              <a:fillRect/>
+            </a:stretch>
+          </p:blipFill>
+          <p:spPr>
+            <a:xfrm>
+              <a:off x="3506141" y="2352606"/>
+              <a:ext cx="1260404" cy="1620204"/>
+            </a:xfrm>
+            <a:prstGeom prst="rect">
+              <a:avLst/>
+            </a:prstGeom>
+          </p:spPr>
+        </p:pic>
+      </p:grpSp>
+    </p:spTree>
+    <p:extLst>
+      <p:ext uri="{BB962C8B-B14F-4D97-AF65-F5344CB8AC3E}">
+        <p14:creationId xmlns:p14="http://schemas.microsoft.com/office/powerpoint/2010/main" val="3446148074"/>
+      </p:ext>
+    </p:extLst>
+  </p:cSld>
+  <p:clrMapOvr>
+    <a:masterClrMapping/>
+  </p:clrMapOvr>
+</p:sld>
+</file>
+
+<file path=ppt/slides/slide3.xml><?xml version="1.0" encoding="utf-8"?>
+<p:sld xmlns:a="http://schemas.openxmlformats.org/drawingml/2006/main" xmlns:r="http://schemas.openxmlformats.org/officeDocument/2006/relationships" xmlns:p="http://schemas.openxmlformats.org/presentationml/2006/main">
+  <p:cSld>
+    <p:spTree>
+      <p:nvGrpSpPr>
+        <p:cNvPr id="1" name="">
+          <a:extLst>
+            <a:ext uri="{FF2B5EF4-FFF2-40B4-BE49-F238E27FC236}">
+              <a16:creationId xmlns:a16="http://schemas.microsoft.com/office/drawing/2014/main" id="{8D31BF4A-C0C4-FF7A-81C8-24996D06CAD1}"/>
+            </a:ext>
+          </a:extLst>
+        </p:cNvPr>
+        <p:cNvGrpSpPr/>
+        <p:nvPr/>
+      </p:nvGrpSpPr>
+      <p:grpSpPr>
+        <a:xfrm>
+          <a:off x="0" y="0"/>
+          <a:ext cx="0" cy="0"/>
+          <a:chOff x="0" y="0"/>
+          <a:chExt cx="0" cy="0"/>
+        </a:xfrm>
+      </p:grpSpPr>
+      <p:sp>
+        <p:nvSpPr>
+          <p:cNvPr id="12" name="사각형: 둥근 모서리 11">
+            <a:extLst>
+              <a:ext uri="{FF2B5EF4-FFF2-40B4-BE49-F238E27FC236}">
+                <a16:creationId xmlns:a16="http://schemas.microsoft.com/office/drawing/2014/main" id="{567D86BE-C61C-13BC-FB1E-C57BBBEDAB5A}"/>
+              </a:ext>
+            </a:extLst>
+          </p:cNvPr>
+          <p:cNvSpPr/>
+          <p:nvPr/>
+        </p:nvSpPr>
+        <p:spPr>
+          <a:xfrm>
+            <a:off x="1803375" y="850790"/>
+            <a:ext cx="8585250" cy="4936692"/>
+          </a:xfrm>
+          <a:prstGeom prst="roundRect">
+            <a:avLst/>
+          </a:prstGeom>
+        </p:spPr>
+        <p:style>
+          <a:lnRef idx="2">
+            <a:schemeClr val="accent1">
+              <a:shade val="50000"/>
+            </a:schemeClr>
+          </a:lnRef>
+          <a:fillRef idx="1">
+            <a:schemeClr val="accent1"/>
+          </a:fillRef>
+          <a:effectRef idx="0">
+            <a:schemeClr val="accent1"/>
+          </a:effectRef>
+          <a:fontRef idx="minor">
+            <a:schemeClr val="lt1"/>
+          </a:fontRef>
+        </p:style>
+        <p:txBody>
+          <a:bodyPr rtlCol="0" anchor="ctr"/>
+          <a:lstStyle/>
+          <a:p>
+            <a:pPr algn="ctr"/>
+            <a:endParaRPr lang="ko-KR" altLang="en-US" b="1" dirty="0"/>
+          </a:p>
+        </p:txBody>
+      </p:sp>
+      <p:grpSp>
+        <p:nvGrpSpPr>
+          <p:cNvPr id="6" name="그룹 5">
+            <a:extLst>
+              <a:ext uri="{FF2B5EF4-FFF2-40B4-BE49-F238E27FC236}">
+                <a16:creationId xmlns:a16="http://schemas.microsoft.com/office/drawing/2014/main" id="{DC1411EF-E621-C132-22C8-DA0734AB1ECE}"/>
+              </a:ext>
+            </a:extLst>
+          </p:cNvPr>
+          <p:cNvGrpSpPr/>
+          <p:nvPr/>
+        </p:nvGrpSpPr>
+        <p:grpSpPr>
+          <a:xfrm>
+            <a:off x="3326969" y="2212383"/>
+            <a:ext cx="5603671" cy="2433234"/>
+            <a:chOff x="3326969" y="2212383"/>
+            <a:chExt cx="5603671" cy="2433234"/>
+          </a:xfrm>
+        </p:grpSpPr>
+        <p:grpSp>
+          <p:nvGrpSpPr>
+            <p:cNvPr id="22" name="그룹 21">
+              <a:extLst>
+                <a:ext uri="{FF2B5EF4-FFF2-40B4-BE49-F238E27FC236}">
+                  <a16:creationId xmlns:a16="http://schemas.microsoft.com/office/drawing/2014/main" id="{FA7BA92C-D834-8520-2AE4-4B1EDC79FA62}"/>
+                </a:ext>
+              </a:extLst>
+            </p:cNvPr>
+            <p:cNvGrpSpPr/>
+            <p:nvPr/>
+          </p:nvGrpSpPr>
+          <p:grpSpPr>
+            <a:xfrm>
+              <a:off x="3326969" y="2212383"/>
+              <a:ext cx="5603671" cy="2433234"/>
+              <a:chOff x="3326969" y="2212383"/>
+              <a:chExt cx="5603671" cy="2433234"/>
+            </a:xfrm>
+          </p:grpSpPr>
+          <p:sp>
+            <p:nvSpPr>
+              <p:cNvPr id="13" name="직사각형 12">
+                <a:extLst>
+                  <a:ext uri="{FF2B5EF4-FFF2-40B4-BE49-F238E27FC236}">
+                    <a16:creationId xmlns:a16="http://schemas.microsoft.com/office/drawing/2014/main" id="{7A022530-F8CA-2B10-188A-05E489C393FF}"/>
+                  </a:ext>
+                </a:extLst>
+              </p:cNvPr>
+              <p:cNvSpPr/>
+              <p:nvPr/>
+            </p:nvSpPr>
+            <p:spPr>
+              <a:xfrm>
+                <a:off x="3326969" y="2212383"/>
+                <a:ext cx="5603671" cy="2433234"/>
+              </a:xfrm>
+              <a:prstGeom prst="rect">
+                <a:avLst/>
+              </a:prstGeom>
+              <a:solidFill>
+                <a:schemeClr val="bg1"/>
+              </a:solidFill>
+              <a:ln>
+                <a:noFill/>
+              </a:ln>
+            </p:spPr>
+            <p:style>
+              <a:lnRef idx="2">
+                <a:schemeClr val="accent1">
+                  <a:shade val="50000"/>
+                </a:schemeClr>
+              </a:lnRef>
+              <a:fillRef idx="1">
+                <a:schemeClr val="accent1"/>
+              </a:fillRef>
+              <a:effectRef idx="0">
+                <a:schemeClr val="accent1"/>
+              </a:effectRef>
+              <a:fontRef idx="minor">
+                <a:schemeClr val="lt1"/>
+              </a:fontRef>
+            </p:style>
+            <p:txBody>
+              <a:bodyPr rtlCol="0" anchor="ctr"/>
+              <a:lstStyle/>
+              <a:p>
+                <a:pPr algn="ctr"/>
+                <a:endParaRPr lang="ko-KR" altLang="en-US" b="1">
+                  <a:latin typeface="JejuGothicOTF" panose="02000300000000000000" pitchFamily="2" charset="-127"/>
+                  <a:ea typeface="JejuGothicOTF" panose="02000300000000000000" pitchFamily="2" charset="-127"/>
+                </a:endParaRPr>
+              </a:p>
+            </p:txBody>
+          </p:sp>
+          <p:sp>
+            <p:nvSpPr>
+              <p:cNvPr id="15" name="TextBox 14">
+                <a:extLst>
+                  <a:ext uri="{FF2B5EF4-FFF2-40B4-BE49-F238E27FC236}">
+                    <a16:creationId xmlns:a16="http://schemas.microsoft.com/office/drawing/2014/main" id="{A0A3B1F3-F2B4-24ED-A06F-287AAFA13973}"/>
+                  </a:ext>
+                </a:extLst>
+              </p:cNvPr>
+              <p:cNvSpPr txBox="1"/>
+              <p:nvPr/>
+            </p:nvSpPr>
+            <p:spPr>
+              <a:xfrm>
+                <a:off x="3495779" y="4024687"/>
+                <a:ext cx="1253869" cy="307777"/>
+              </a:xfrm>
+              <a:prstGeom prst="rect">
+                <a:avLst/>
+              </a:prstGeom>
+              <a:solidFill>
+                <a:schemeClr val="bg1"/>
+              </a:solidFill>
+            </p:spPr>
+            <p:txBody>
+              <a:bodyPr wrap="none" rtlCol="0">
+                <a:spAutoFit/>
+              </a:bodyPr>
+              <a:lstStyle/>
+              <a:p>
+                <a:pPr algn="ctr"/>
+                <a:r>
+                  <a:rPr lang="ko-KR" altLang="en-US" sz="1400" b="1" dirty="0">
+                    <a:latin typeface="JejuGothicOTF" panose="02000300000000000000" pitchFamily="2" charset="-127"/>
+                    <a:ea typeface="JejuGothicOTF" panose="02000300000000000000" pitchFamily="2" charset="-127"/>
+                  </a:rPr>
+                  <a:t>성명 </a:t>
+                </a:r>
+                <a:r>
+                  <a:rPr lang="en-US" altLang="ko-KR" sz="1400" b="1" dirty="0">
+                    <a:latin typeface="JejuGothicOTF" panose="02000300000000000000" pitchFamily="2" charset="-127"/>
+                    <a:ea typeface="JejuGothicOTF" panose="02000300000000000000" pitchFamily="2" charset="-127"/>
+                  </a:rPr>
+                  <a:t>: </a:t>
+                </a:r>
+                <a:r>
+                  <a:rPr lang="ko-KR" altLang="en-US" sz="1400" b="1" dirty="0">
+                    <a:latin typeface="JejuGothicOTF" panose="02000300000000000000" pitchFamily="2" charset="-127"/>
+                    <a:ea typeface="JejuGothicOTF" panose="02000300000000000000" pitchFamily="2" charset="-127"/>
+                  </a:rPr>
+                  <a:t>김준우</a:t>
+                </a:r>
+              </a:p>
+            </p:txBody>
+          </p:sp>
+          <p:sp>
+            <p:nvSpPr>
+              <p:cNvPr id="2" name="TextBox 1">
+                <a:extLst>
+                  <a:ext uri="{FF2B5EF4-FFF2-40B4-BE49-F238E27FC236}">
+                    <a16:creationId xmlns:a16="http://schemas.microsoft.com/office/drawing/2014/main" id="{E02AA7A0-6CCA-40FA-F21D-71988F812CFA}"/>
+                  </a:ext>
+                </a:extLst>
+              </p:cNvPr>
+              <p:cNvSpPr txBox="1"/>
+              <p:nvPr/>
+            </p:nvSpPr>
+            <p:spPr>
+              <a:xfrm>
+                <a:off x="4898140" y="2577981"/>
+                <a:ext cx="4017203" cy="1600438"/>
+              </a:xfrm>
+              <a:prstGeom prst="rect">
+                <a:avLst/>
+              </a:prstGeom>
+              <a:solidFill>
+                <a:schemeClr val="bg1"/>
+              </a:solidFill>
+            </p:spPr>
+            <p:txBody>
+              <a:bodyPr wrap="square" rtlCol="0">
+                <a:spAutoFit/>
+              </a:bodyPr>
+              <a:lstStyle/>
+              <a:p>
+                <a:pPr marL="285750" indent="-285750">
+                  <a:buFont typeface="Arial" panose="020B0604020202020204" pitchFamily="34" charset="0"/>
+                  <a:buChar char="•"/>
+                </a:pPr>
+                <a:r>
+                  <a:rPr lang="ko-KR" altLang="en-US" sz="1400" b="1" dirty="0">
+                    <a:latin typeface="JejuGothicOTF" panose="02000300000000000000" pitchFamily="2" charset="-127"/>
+                    <a:ea typeface="JejuGothicOTF" panose="02000300000000000000" pitchFamily="2" charset="-127"/>
+                  </a:rPr>
+                  <a:t>현      재 </a:t>
+                </a:r>
+                <a:r>
+                  <a:rPr lang="en-US" altLang="ko-KR" sz="1400" b="1" dirty="0">
+                    <a:latin typeface="JejuGothicOTF" panose="02000300000000000000" pitchFamily="2" charset="-127"/>
+                    <a:ea typeface="JejuGothicOTF" panose="02000300000000000000" pitchFamily="2" charset="-127"/>
+                  </a:rPr>
+                  <a:t>: </a:t>
+                </a:r>
+                <a:r>
+                  <a:rPr lang="ko-KR" altLang="en-US" sz="1400" b="1" dirty="0">
+                    <a:latin typeface="JejuGothicOTF" panose="02000300000000000000" pitchFamily="2" charset="-127"/>
+                    <a:ea typeface="JejuGothicOTF" panose="02000300000000000000" pitchFamily="2" charset="-127"/>
+                  </a:rPr>
+                  <a:t>학부과정</a:t>
+                </a:r>
+                <a:endParaRPr lang="en-US" altLang="ko-KR" sz="1400" b="1" dirty="0">
+                  <a:latin typeface="JejuGothicOTF" panose="02000300000000000000" pitchFamily="2" charset="-127"/>
+                  <a:ea typeface="JejuGothicOTF" panose="02000300000000000000" pitchFamily="2" charset="-127"/>
+                </a:endParaRPr>
+              </a:p>
+              <a:p>
+                <a:pPr marL="285750" indent="-285750">
+                  <a:buFont typeface="Arial" panose="020B0604020202020204" pitchFamily="34" charset="0"/>
+                  <a:buChar char="•"/>
+                </a:pPr>
+                <a:endParaRPr lang="en-US" altLang="ko-KR" sz="1400" b="1" dirty="0">
+                  <a:latin typeface="JejuGothicOTF" panose="02000300000000000000" pitchFamily="2" charset="-127"/>
+                  <a:ea typeface="JejuGothicOTF" panose="02000300000000000000" pitchFamily="2" charset="-127"/>
+                </a:endParaRPr>
+              </a:p>
+              <a:p>
+                <a:pPr marL="285750" indent="-285750">
+                  <a:buFont typeface="Arial" panose="020B0604020202020204" pitchFamily="34" charset="0"/>
+                  <a:buChar char="•"/>
+                </a:pPr>
+                <a:r>
+                  <a:rPr lang="ko-KR" altLang="en-US" sz="1400" b="1" dirty="0">
+                    <a:latin typeface="JejuGothicOTF" panose="02000300000000000000" pitchFamily="2" charset="-127"/>
+                    <a:ea typeface="JejuGothicOTF" panose="02000300000000000000" pitchFamily="2" charset="-127"/>
+                  </a:rPr>
+                  <a:t>관심분야 </a:t>
+                </a:r>
+                <a:r>
+                  <a:rPr lang="en-US" altLang="ko-KR" sz="1400" b="1" dirty="0">
+                    <a:latin typeface="JejuGothicOTF" panose="02000300000000000000" pitchFamily="2" charset="-127"/>
+                    <a:ea typeface="JejuGothicOTF" panose="02000300000000000000" pitchFamily="2" charset="-127"/>
+                  </a:rPr>
+                  <a:t>: Natural</a:t>
+                </a:r>
+                <a:r>
+                  <a:rPr lang="ko-KR" altLang="en-US" sz="1400" b="1" dirty="0">
+                    <a:latin typeface="JejuGothicOTF" panose="02000300000000000000" pitchFamily="2" charset="-127"/>
+                    <a:ea typeface="JejuGothicOTF" panose="02000300000000000000" pitchFamily="2" charset="-127"/>
+                  </a:rPr>
+                  <a:t> </a:t>
+                </a:r>
+                <a:r>
+                  <a:rPr lang="en-US" altLang="ko-KR" sz="1400" b="1" dirty="0">
+                    <a:latin typeface="JejuGothicOTF" panose="02000300000000000000" pitchFamily="2" charset="-127"/>
+                    <a:ea typeface="JejuGothicOTF" panose="02000300000000000000" pitchFamily="2" charset="-127"/>
+                  </a:rPr>
+                  <a:t>Language</a:t>
+                </a:r>
+                <a:r>
+                  <a:rPr lang="ko-KR" altLang="en-US" sz="1400" b="1" dirty="0">
+                    <a:latin typeface="JejuGothicOTF" panose="02000300000000000000" pitchFamily="2" charset="-127"/>
+                    <a:ea typeface="JejuGothicOTF" panose="02000300000000000000" pitchFamily="2" charset="-127"/>
+                  </a:rPr>
+                  <a:t> </a:t>
+                </a:r>
+                <a:r>
+                  <a:rPr lang="en-US" altLang="ko-KR" sz="1400" b="1" dirty="0">
+                    <a:latin typeface="JejuGothicOTF" panose="02000300000000000000" pitchFamily="2" charset="-127"/>
+                    <a:ea typeface="JejuGothicOTF" panose="02000300000000000000" pitchFamily="2" charset="-127"/>
+                  </a:rPr>
+                  <a:t>Processing</a:t>
+                </a:r>
+                <a:br>
+                  <a:rPr lang="en-US" altLang="ko-KR" sz="1400" b="1" dirty="0">
+                    <a:latin typeface="JejuGothicOTF" panose="02000300000000000000" pitchFamily="2" charset="-127"/>
+                    <a:ea typeface="JejuGothicOTF" panose="02000300000000000000" pitchFamily="2" charset="-127"/>
+                  </a:rPr>
+                </a:br>
+                <a:endParaRPr lang="en-US" altLang="ko-KR" sz="1400" b="1" dirty="0">
+                  <a:latin typeface="JejuGothicOTF" panose="02000300000000000000" pitchFamily="2" charset="-127"/>
+                  <a:ea typeface="JejuGothicOTF" panose="02000300000000000000" pitchFamily="2" charset="-127"/>
+                </a:endParaRPr>
+              </a:p>
+              <a:p>
+                <a:pPr marL="285750" indent="-285750">
+                  <a:buFont typeface="Arial" panose="020B0604020202020204" pitchFamily="34" charset="0"/>
+                  <a:buChar char="•"/>
+                </a:pPr>
+                <a:r>
+                  <a:rPr lang="en-US" altLang="ko-KR" sz="1400" b="1" dirty="0">
+                    <a:latin typeface="JejuGothicOTF" panose="02000300000000000000" pitchFamily="2" charset="-127"/>
+                    <a:ea typeface="JejuGothicOTF" panose="02000300000000000000" pitchFamily="2" charset="-127"/>
+                  </a:rPr>
+                  <a:t> E-mail  : andykim030618@gmail.com</a:t>
+                </a:r>
+              </a:p>
+              <a:p>
+                <a:pPr marL="285750" indent="-285750">
+                  <a:buFont typeface="Arial" panose="020B0604020202020204" pitchFamily="34" charset="0"/>
+                  <a:buChar char="•"/>
+                </a:pPr>
+                <a:endParaRPr lang="en-US" altLang="ko-KR" sz="1400" b="1" dirty="0">
+                  <a:latin typeface="JejuGothicOTF" panose="02000300000000000000" pitchFamily="2" charset="-127"/>
+                  <a:ea typeface="JejuGothicOTF" panose="02000300000000000000" pitchFamily="2" charset="-127"/>
+                </a:endParaRPr>
+              </a:p>
+              <a:p>
+                <a:pPr marL="285750" indent="-285750">
+                  <a:buFont typeface="Arial" panose="020B0604020202020204" pitchFamily="34" charset="0"/>
+                  <a:buChar char="•"/>
+                </a:pPr>
+                <a:r>
+                  <a:rPr lang="ko-KR" altLang="en-US" sz="1400" b="1" dirty="0">
+                    <a:latin typeface="JejuGothicOTF" panose="02000300000000000000" pitchFamily="2" charset="-127"/>
+                    <a:ea typeface="JejuGothicOTF" panose="02000300000000000000" pitchFamily="2" charset="-127"/>
+                  </a:rPr>
+                  <a:t>홈페이지</a:t>
+                </a:r>
+                <a:r>
+                  <a:rPr lang="en-US" altLang="ko-KR" sz="1400" b="1" dirty="0">
+                    <a:latin typeface="JejuGothicOTF" panose="02000300000000000000" pitchFamily="2" charset="-127"/>
+                    <a:ea typeface="JejuGothicOTF" panose="02000300000000000000" pitchFamily="2" charset="-127"/>
+                  </a:rPr>
+                  <a:t>:</a:t>
+                </a:r>
+                <a:endParaRPr lang="en-US" altLang="ko-KR" sz="1300" b="1" dirty="0">
+                  <a:latin typeface="JejuGothicOTF" panose="02000300000000000000" pitchFamily="2" charset="-127"/>
+                  <a:ea typeface="JejuGothicOTF" panose="02000300000000000000" pitchFamily="2" charset="-127"/>
+                </a:endParaRPr>
+              </a:p>
+            </p:txBody>
+          </p:sp>
+        </p:grpSp>
+        <p:pic>
+          <p:nvPicPr>
+            <p:cNvPr id="5" name="그림 4" descr="사람, 의류, 인간의 얼굴, 턱이(가) 표시된 사진&#10;&#10;AI 생성 콘텐츠는 정확하지 않을 수 있습니다.">
+              <a:extLst>
+                <a:ext uri="{FF2B5EF4-FFF2-40B4-BE49-F238E27FC236}">
+                  <a16:creationId xmlns:a16="http://schemas.microsoft.com/office/drawing/2014/main" id="{0825C4BB-25A9-D711-A63A-E782261D1FB6}"/>
+                </a:ext>
+              </a:extLst>
+            </p:cNvPr>
+            <p:cNvPicPr>
+              <a:picLocks noChangeAspect="1"/>
+            </p:cNvPicPr>
+            <p:nvPr/>
+          </p:nvPicPr>
+          <p:blipFill>
+            <a:blip r:embed="rId2">
+              <a:extLst>
+                <a:ext uri="{28A0092B-C50C-407E-A947-70E740481C1C}">
+                  <a14:useLocalDpi xmlns:a14="http://schemas.microsoft.com/office/drawing/2010/main" val="0"/>
+                </a:ext>
+              </a:extLst>
+            </a:blip>
+            <a:stretch>
+              <a:fillRect/>
+            </a:stretch>
+          </p:blipFill>
+          <p:spPr>
+            <a:xfrm>
+              <a:off x="3535534" y="2373420"/>
+              <a:ext cx="1270766" cy="1620204"/>
+            </a:xfrm>
+            <a:prstGeom prst="rect">
+              <a:avLst/>
+            </a:prstGeom>
+          </p:spPr>
+        </p:pic>
+      </p:grpSp>
+    </p:spTree>
+    <p:extLst>
+      <p:ext uri="{BB962C8B-B14F-4D97-AF65-F5344CB8AC3E}">
+        <p14:creationId xmlns:p14="http://schemas.microsoft.com/office/powerpoint/2010/main" val="2726040161"/>
+      </p:ext>
+    </p:extLst>
+  </p:cSld>
+  <p:clrMapOvr>
+    <a:masterClrMapping/>
+  </p:clrMapOvr>
+</p:sld>
+</file>
+
+<file path=ppt/slides/slide4.xml><?xml version="1.0" encoding="utf-8"?>
+<p:sld xmlns:a="http://schemas.openxmlformats.org/drawingml/2006/main" xmlns:r="http://schemas.openxmlformats.org/officeDocument/2006/relationships" xmlns:p="http://schemas.openxmlformats.org/presentationml/2006/main">
+  <p:cSld>
+    <p:spTree>
+      <p:nvGrpSpPr>
+        <p:cNvPr id="1" name="">
+          <a:extLst>
+            <a:ext uri="{FF2B5EF4-FFF2-40B4-BE49-F238E27FC236}">
+              <a16:creationId xmlns:a16="http://schemas.microsoft.com/office/drawing/2014/main" id="{EAF26104-6A8A-C832-86E8-3DB1EA33403F}"/>
+            </a:ext>
+          </a:extLst>
+        </p:cNvPr>
+        <p:cNvGrpSpPr/>
+        <p:nvPr/>
+      </p:nvGrpSpPr>
+      <p:grpSpPr>
+        <a:xfrm>
+          <a:off x="0" y="0"/>
+          <a:ext cx="0" cy="0"/>
+          <a:chOff x="0" y="0"/>
+          <a:chExt cx="0" cy="0"/>
+        </a:xfrm>
+      </p:grpSpPr>
+      <p:sp>
+        <p:nvSpPr>
+          <p:cNvPr id="12" name="사각형: 둥근 모서리 11">
+            <a:extLst>
+              <a:ext uri="{FF2B5EF4-FFF2-40B4-BE49-F238E27FC236}">
+                <a16:creationId xmlns:a16="http://schemas.microsoft.com/office/drawing/2014/main" id="{8E8CB494-BE44-4DA9-D3B6-054F75E9FC13}"/>
+              </a:ext>
+            </a:extLst>
+          </p:cNvPr>
+          <p:cNvSpPr/>
+          <p:nvPr/>
+        </p:nvSpPr>
+        <p:spPr>
+          <a:xfrm>
+            <a:off x="1803375" y="850790"/>
+            <a:ext cx="8585250" cy="4936692"/>
+          </a:xfrm>
+          <a:prstGeom prst="roundRect">
+            <a:avLst/>
+          </a:prstGeom>
+        </p:spPr>
+        <p:style>
+          <a:lnRef idx="2">
+            <a:schemeClr val="accent1">
+              <a:shade val="50000"/>
+            </a:schemeClr>
+          </a:lnRef>
+          <a:fillRef idx="1">
+            <a:schemeClr val="accent1"/>
+          </a:fillRef>
+          <a:effectRef idx="0">
+            <a:schemeClr val="accent1"/>
+          </a:effectRef>
+          <a:fontRef idx="minor">
+            <a:schemeClr val="lt1"/>
+          </a:fontRef>
+        </p:style>
+        <p:txBody>
+          <a:bodyPr rtlCol="0" anchor="ctr"/>
+          <a:lstStyle/>
+          <a:p>
+            <a:pPr algn="ctr"/>
+            <a:endParaRPr lang="ko-KR" altLang="en-US" b="1" dirty="0"/>
+          </a:p>
+        </p:txBody>
+      </p:sp>
+      <p:grpSp>
+        <p:nvGrpSpPr>
+          <p:cNvPr id="7" name="그룹 6">
+            <a:extLst>
+              <a:ext uri="{FF2B5EF4-FFF2-40B4-BE49-F238E27FC236}">
+                <a16:creationId xmlns:a16="http://schemas.microsoft.com/office/drawing/2014/main" id="{B1CEE0AA-23F3-4D05-35D7-E60A631DF086}"/>
+              </a:ext>
+            </a:extLst>
+          </p:cNvPr>
+          <p:cNvGrpSpPr/>
+          <p:nvPr/>
+        </p:nvGrpSpPr>
+        <p:grpSpPr>
+          <a:xfrm>
+            <a:off x="3326969" y="2212383"/>
+            <a:ext cx="5603671" cy="2433234"/>
+            <a:chOff x="3326969" y="2212383"/>
+            <a:chExt cx="5603671" cy="2433234"/>
+          </a:xfrm>
+        </p:grpSpPr>
+        <p:grpSp>
+          <p:nvGrpSpPr>
+            <p:cNvPr id="22" name="그룹 21">
+              <a:extLst>
+                <a:ext uri="{FF2B5EF4-FFF2-40B4-BE49-F238E27FC236}">
+                  <a16:creationId xmlns:a16="http://schemas.microsoft.com/office/drawing/2014/main" id="{3547EDB0-C423-76FD-0CE7-B61E55601DD9}"/>
+                </a:ext>
+              </a:extLst>
+            </p:cNvPr>
+            <p:cNvGrpSpPr/>
+            <p:nvPr/>
+          </p:nvGrpSpPr>
+          <p:grpSpPr>
+            <a:xfrm>
+              <a:off x="3326969" y="2212383"/>
+              <a:ext cx="5603671" cy="2433234"/>
+              <a:chOff x="3326969" y="2212383"/>
+              <a:chExt cx="5603671" cy="2433234"/>
+            </a:xfrm>
+          </p:grpSpPr>
+          <p:sp>
+            <p:nvSpPr>
+              <p:cNvPr id="13" name="직사각형 12">
+                <a:extLst>
+                  <a:ext uri="{FF2B5EF4-FFF2-40B4-BE49-F238E27FC236}">
+                    <a16:creationId xmlns:a16="http://schemas.microsoft.com/office/drawing/2014/main" id="{E6A8E53F-075B-DF19-FC43-84CDD33BDEA8}"/>
+                  </a:ext>
+                </a:extLst>
+              </p:cNvPr>
+              <p:cNvSpPr/>
+              <p:nvPr/>
+            </p:nvSpPr>
+            <p:spPr>
+              <a:xfrm>
+                <a:off x="3326969" y="2212383"/>
+                <a:ext cx="5603671" cy="2433234"/>
+              </a:xfrm>
+              <a:prstGeom prst="rect">
+                <a:avLst/>
+              </a:prstGeom>
+              <a:solidFill>
+                <a:schemeClr val="bg1"/>
+              </a:solidFill>
+              <a:ln>
+                <a:noFill/>
+              </a:ln>
+            </p:spPr>
+            <p:style>
+              <a:lnRef idx="2">
+                <a:schemeClr val="accent1">
+                  <a:shade val="50000"/>
+                </a:schemeClr>
+              </a:lnRef>
+              <a:fillRef idx="1">
+                <a:schemeClr val="accent1"/>
+              </a:fillRef>
+              <a:effectRef idx="0">
+                <a:schemeClr val="accent1"/>
+              </a:effectRef>
+              <a:fontRef idx="minor">
+                <a:schemeClr val="lt1"/>
+              </a:fontRef>
+            </p:style>
+            <p:txBody>
+              <a:bodyPr rtlCol="0" anchor="ctr"/>
+              <a:lstStyle/>
+              <a:p>
+                <a:pPr algn="ctr"/>
+                <a:endParaRPr lang="ko-KR" altLang="en-US" b="1">
+                  <a:latin typeface="JejuGothicOTF" panose="02000300000000000000" pitchFamily="2" charset="-127"/>
+                  <a:ea typeface="JejuGothicOTF" panose="02000300000000000000" pitchFamily="2" charset="-127"/>
+                </a:endParaRPr>
+              </a:p>
+            </p:txBody>
+          </p:sp>
+          <p:sp>
+            <p:nvSpPr>
+              <p:cNvPr id="15" name="TextBox 14">
+                <a:extLst>
+                  <a:ext uri="{FF2B5EF4-FFF2-40B4-BE49-F238E27FC236}">
+                    <a16:creationId xmlns:a16="http://schemas.microsoft.com/office/drawing/2014/main" id="{9709A06D-EF3C-F47B-425C-538B3DB4B898}"/>
+                  </a:ext>
+                </a:extLst>
+              </p:cNvPr>
+              <p:cNvSpPr txBox="1"/>
+              <p:nvPr/>
+            </p:nvSpPr>
+            <p:spPr>
+              <a:xfrm>
+                <a:off x="3495779" y="4024687"/>
+                <a:ext cx="1253869" cy="307777"/>
+              </a:xfrm>
+              <a:prstGeom prst="rect">
+                <a:avLst/>
+              </a:prstGeom>
+              <a:solidFill>
+                <a:schemeClr val="bg1"/>
+              </a:solidFill>
+            </p:spPr>
+            <p:txBody>
+              <a:bodyPr wrap="none" rtlCol="0">
+                <a:spAutoFit/>
+              </a:bodyPr>
+              <a:lstStyle/>
+              <a:p>
+                <a:pPr algn="ctr"/>
+                <a:r>
+                  <a:rPr lang="ko-KR" altLang="en-US" sz="1400" b="1" dirty="0">
+                    <a:latin typeface="JejuGothicOTF" panose="02000300000000000000" pitchFamily="2" charset="-127"/>
+                    <a:ea typeface="JejuGothicOTF" panose="02000300000000000000" pitchFamily="2" charset="-127"/>
+                  </a:rPr>
+                  <a:t>성명 </a:t>
+                </a:r>
+                <a:r>
+                  <a:rPr lang="en-US" altLang="ko-KR" sz="1400" b="1" dirty="0">
+                    <a:latin typeface="JejuGothicOTF" panose="02000300000000000000" pitchFamily="2" charset="-127"/>
+                    <a:ea typeface="JejuGothicOTF" panose="02000300000000000000" pitchFamily="2" charset="-127"/>
+                  </a:rPr>
+                  <a:t>: </a:t>
+                </a:r>
+                <a:r>
+                  <a:rPr lang="ko-KR" altLang="en-US" sz="1400" b="1" dirty="0">
+                    <a:latin typeface="JejuGothicOTF" panose="02000300000000000000" pitchFamily="2" charset="-127"/>
+                    <a:ea typeface="JejuGothicOTF" panose="02000300000000000000" pitchFamily="2" charset="-127"/>
+                  </a:rPr>
+                  <a:t>강수빈</a:t>
+                </a:r>
+              </a:p>
+            </p:txBody>
+          </p:sp>
+          <p:sp>
+            <p:nvSpPr>
+              <p:cNvPr id="2" name="TextBox 1">
+                <a:extLst>
+                  <a:ext uri="{FF2B5EF4-FFF2-40B4-BE49-F238E27FC236}">
+                    <a16:creationId xmlns:a16="http://schemas.microsoft.com/office/drawing/2014/main" id="{69162E76-9B25-1588-E88A-CBEA91DD170C}"/>
+                  </a:ext>
+                </a:extLst>
+              </p:cNvPr>
+              <p:cNvSpPr txBox="1"/>
+              <p:nvPr/>
+            </p:nvSpPr>
+            <p:spPr>
+              <a:xfrm>
+                <a:off x="4898140" y="2577981"/>
+                <a:ext cx="4017203" cy="1600438"/>
+              </a:xfrm>
+              <a:prstGeom prst="rect">
+                <a:avLst/>
+              </a:prstGeom>
+              <a:solidFill>
+                <a:schemeClr val="bg1"/>
+              </a:solidFill>
+            </p:spPr>
+            <p:txBody>
+              <a:bodyPr wrap="square" rtlCol="0">
+                <a:spAutoFit/>
+              </a:bodyPr>
+              <a:lstStyle/>
+              <a:p>
+                <a:pPr marL="285750" indent="-285750">
+                  <a:buFont typeface="Arial" panose="020B0604020202020204" pitchFamily="34" charset="0"/>
+                  <a:buChar char="•"/>
+                </a:pPr>
+                <a:r>
+                  <a:rPr lang="ko-KR" altLang="en-US" sz="1400" b="1" dirty="0">
+                    <a:latin typeface="JejuGothicOTF" panose="02000300000000000000" pitchFamily="2" charset="-127"/>
+                    <a:ea typeface="JejuGothicOTF" panose="02000300000000000000" pitchFamily="2" charset="-127"/>
+                  </a:rPr>
+                  <a:t>현      재 </a:t>
+                </a:r>
+                <a:r>
+                  <a:rPr lang="en-US" altLang="ko-KR" sz="1400" b="1" dirty="0">
+                    <a:latin typeface="JejuGothicOTF" panose="02000300000000000000" pitchFamily="2" charset="-127"/>
+                    <a:ea typeface="JejuGothicOTF" panose="02000300000000000000" pitchFamily="2" charset="-127"/>
+                  </a:rPr>
+                  <a:t>: </a:t>
+                </a:r>
+                <a:r>
+                  <a:rPr lang="ko-KR" altLang="en-US" sz="1400" b="1" dirty="0">
+                    <a:latin typeface="JejuGothicOTF" panose="02000300000000000000" pitchFamily="2" charset="-127"/>
+                    <a:ea typeface="JejuGothicOTF" panose="02000300000000000000" pitchFamily="2" charset="-127"/>
+                  </a:rPr>
+                  <a:t>학부과정</a:t>
+                </a:r>
+                <a:endParaRPr lang="en-US" altLang="ko-KR" sz="1400" b="1" dirty="0">
+                  <a:latin typeface="JejuGothicOTF" panose="02000300000000000000" pitchFamily="2" charset="-127"/>
+                  <a:ea typeface="JejuGothicOTF" panose="02000300000000000000" pitchFamily="2" charset="-127"/>
+                </a:endParaRPr>
+              </a:p>
+              <a:p>
+                <a:pPr marL="285750" indent="-285750">
+                  <a:buFont typeface="Arial" panose="020B0604020202020204" pitchFamily="34" charset="0"/>
+                  <a:buChar char="•"/>
+                </a:pPr>
+                <a:endParaRPr lang="en-US" altLang="ko-KR" sz="1400" b="1" dirty="0">
+                  <a:latin typeface="JejuGothicOTF" panose="02000300000000000000" pitchFamily="2" charset="-127"/>
+                  <a:ea typeface="JejuGothicOTF" panose="02000300000000000000" pitchFamily="2" charset="-127"/>
+                </a:endParaRPr>
+              </a:p>
+              <a:p>
+                <a:pPr marL="285750" indent="-285750">
+                  <a:buFont typeface="Arial" panose="020B0604020202020204" pitchFamily="34" charset="0"/>
+                  <a:buChar char="•"/>
+                </a:pPr>
+                <a:r>
+                  <a:rPr lang="ko-KR" altLang="en-US" sz="1400" b="1" dirty="0">
+                    <a:latin typeface="JejuGothicOTF" panose="02000300000000000000" pitchFamily="2" charset="-127"/>
+                    <a:ea typeface="JejuGothicOTF" panose="02000300000000000000" pitchFamily="2" charset="-127"/>
+                  </a:rPr>
+                  <a:t>관심분야 </a:t>
+                </a:r>
+                <a:r>
+                  <a:rPr lang="en-US" altLang="ko-KR" sz="1400" b="1" dirty="0">
+                    <a:latin typeface="JejuGothicOTF" panose="02000300000000000000" pitchFamily="2" charset="-127"/>
+                    <a:ea typeface="JejuGothicOTF" panose="02000300000000000000" pitchFamily="2" charset="-127"/>
+                  </a:rPr>
+                  <a:t>: Natural</a:t>
+                </a:r>
+                <a:r>
+                  <a:rPr lang="ko-KR" altLang="en-US" sz="1400" b="1" dirty="0">
+                    <a:latin typeface="JejuGothicOTF" panose="02000300000000000000" pitchFamily="2" charset="-127"/>
+                    <a:ea typeface="JejuGothicOTF" panose="02000300000000000000" pitchFamily="2" charset="-127"/>
+                  </a:rPr>
+                  <a:t> </a:t>
+                </a:r>
+                <a:r>
+                  <a:rPr lang="en-US" altLang="ko-KR" sz="1400" b="1" dirty="0">
+                    <a:latin typeface="JejuGothicOTF" panose="02000300000000000000" pitchFamily="2" charset="-127"/>
+                    <a:ea typeface="JejuGothicOTF" panose="02000300000000000000" pitchFamily="2" charset="-127"/>
+                  </a:rPr>
+                  <a:t>Language</a:t>
+                </a:r>
+                <a:r>
+                  <a:rPr lang="ko-KR" altLang="en-US" sz="1400" b="1" dirty="0">
+                    <a:latin typeface="JejuGothicOTF" panose="02000300000000000000" pitchFamily="2" charset="-127"/>
+                    <a:ea typeface="JejuGothicOTF" panose="02000300000000000000" pitchFamily="2" charset="-127"/>
+                  </a:rPr>
+                  <a:t> </a:t>
+                </a:r>
+                <a:r>
+                  <a:rPr lang="en-US" altLang="ko-KR" sz="1400" b="1" dirty="0">
+                    <a:latin typeface="JejuGothicOTF" panose="02000300000000000000" pitchFamily="2" charset="-127"/>
+                    <a:ea typeface="JejuGothicOTF" panose="02000300000000000000" pitchFamily="2" charset="-127"/>
+                  </a:rPr>
+                  <a:t>Processing</a:t>
+                </a:r>
+                <a:br>
+                  <a:rPr lang="en-US" altLang="ko-KR" sz="1400" b="1" dirty="0">
+                    <a:latin typeface="JejuGothicOTF" panose="02000300000000000000" pitchFamily="2" charset="-127"/>
+                    <a:ea typeface="JejuGothicOTF" panose="02000300000000000000" pitchFamily="2" charset="-127"/>
+                  </a:rPr>
+                </a:br>
+                <a:endParaRPr lang="en-US" altLang="ko-KR" sz="1400" b="1" dirty="0">
+                  <a:latin typeface="JejuGothicOTF" panose="02000300000000000000" pitchFamily="2" charset="-127"/>
+                  <a:ea typeface="JejuGothicOTF" panose="02000300000000000000" pitchFamily="2" charset="-127"/>
+                </a:endParaRPr>
+              </a:p>
+              <a:p>
+                <a:pPr marL="285750" indent="-285750">
+                  <a:buFont typeface="Arial" panose="020B0604020202020204" pitchFamily="34" charset="0"/>
+                  <a:buChar char="•"/>
+                </a:pPr>
+                <a:r>
+                  <a:rPr lang="en-US" altLang="ko-KR" sz="1400" b="1" dirty="0">
+                    <a:latin typeface="JejuGothicOTF" panose="02000300000000000000" pitchFamily="2" charset="-127"/>
+                    <a:ea typeface="JejuGothicOTF" panose="02000300000000000000" pitchFamily="2" charset="-127"/>
+                  </a:rPr>
+                  <a:t> E-mail  : eqsubin@gmail.com</a:t>
+                </a:r>
+              </a:p>
+              <a:p>
+                <a:pPr marL="285750" indent="-285750">
+                  <a:buFont typeface="Arial" panose="020B0604020202020204" pitchFamily="34" charset="0"/>
+                  <a:buChar char="•"/>
+                </a:pPr>
+                <a:endParaRPr lang="en-US" altLang="ko-KR" sz="1400" b="1" dirty="0">
+                  <a:latin typeface="JejuGothicOTF" panose="02000300000000000000" pitchFamily="2" charset="-127"/>
+                  <a:ea typeface="JejuGothicOTF" panose="02000300000000000000" pitchFamily="2" charset="-127"/>
+                </a:endParaRPr>
+              </a:p>
+              <a:p>
+                <a:pPr marL="285750" indent="-285750">
+                  <a:buFont typeface="Arial" panose="020B0604020202020204" pitchFamily="34" charset="0"/>
+                  <a:buChar char="•"/>
+                </a:pPr>
+                <a:r>
+                  <a:rPr lang="ko-KR" altLang="en-US" sz="1400" b="1" dirty="0">
+                    <a:latin typeface="JejuGothicOTF" panose="02000300000000000000" pitchFamily="2" charset="-127"/>
+                    <a:ea typeface="JejuGothicOTF" panose="02000300000000000000" pitchFamily="2" charset="-127"/>
+                  </a:rPr>
+                  <a:t>홈페이지</a:t>
+                </a:r>
+                <a:r>
+                  <a:rPr lang="en-US" altLang="ko-KR" sz="1400" b="1" dirty="0">
+                    <a:latin typeface="JejuGothicOTF" panose="02000300000000000000" pitchFamily="2" charset="-127"/>
+                    <a:ea typeface="JejuGothicOTF" panose="02000300000000000000" pitchFamily="2" charset="-127"/>
+                  </a:rPr>
+                  <a:t>:</a:t>
+                </a:r>
+                <a:endParaRPr lang="en-US" altLang="ko-KR" sz="1300" b="1" dirty="0">
+                  <a:latin typeface="JejuGothicOTF" panose="02000300000000000000" pitchFamily="2" charset="-127"/>
+                  <a:ea typeface="JejuGothicOTF" panose="02000300000000000000" pitchFamily="2" charset="-127"/>
+                </a:endParaRPr>
+              </a:p>
+            </p:txBody>
+          </p:sp>
+        </p:grpSp>
+        <p:pic>
+          <p:nvPicPr>
+            <p:cNvPr id="6" name="그림 5" descr="헤어피스, 의류, 인간의 얼굴, 사람이(가) 표시된 사진&#10;&#10;AI 생성 콘텐츠는 정확하지 않을 수 있습니다.">
+              <a:extLst>
+                <a:ext uri="{FF2B5EF4-FFF2-40B4-BE49-F238E27FC236}">
+                  <a16:creationId xmlns:a16="http://schemas.microsoft.com/office/drawing/2014/main" id="{3D0F7093-D1AA-CC91-ECCA-66A4238507BB}"/>
+                </a:ext>
+              </a:extLst>
+            </p:cNvPr>
+            <p:cNvPicPr>
+              <a:picLocks noChangeAspect="1"/>
+            </p:cNvPicPr>
+            <p:nvPr/>
+          </p:nvPicPr>
+          <p:blipFill>
+            <a:blip r:embed="rId2">
+              <a:extLst>
+                <a:ext uri="{28A0092B-C50C-407E-A947-70E740481C1C}">
+                  <a14:useLocalDpi xmlns:a14="http://schemas.microsoft.com/office/drawing/2010/main" val="0"/>
+                </a:ext>
+              </a:extLst>
+            </a:blip>
+            <a:stretch>
+              <a:fillRect/>
+            </a:stretch>
+          </p:blipFill>
+          <p:spPr>
+            <a:xfrm>
+              <a:off x="3532217" y="2352606"/>
+              <a:ext cx="1260000" cy="1620000"/>
+            </a:xfrm>
+            <a:prstGeom prst="rect">
+              <a:avLst/>
+            </a:prstGeom>
+          </p:spPr>
+        </p:pic>
+      </p:grpSp>
+    </p:spTree>
+    <p:extLst>
+      <p:ext uri="{BB962C8B-B14F-4D97-AF65-F5344CB8AC3E}">
+        <p14:creationId xmlns:p14="http://schemas.microsoft.com/office/powerpoint/2010/main" val="1348173920"/>
+      </p:ext>
+    </p:extLst>
+  </p:cSld>
+  <p:clrMapOvr>
+    <a:masterClrMapping/>
+  </p:clrMapOvr>
+</p:sld>
+</file>
+
+<file path=ppt/slides/slide5.xml><?xml version="1.0" encoding="utf-8"?>
+<p:sld xmlns:a="http://schemas.openxmlformats.org/drawingml/2006/main" xmlns:r="http://schemas.openxmlformats.org/officeDocument/2006/relationships" xmlns:p="http://schemas.openxmlformats.org/presentationml/2006/main">
+  <p:cSld>
+    <p:spTree>
+      <p:nvGrpSpPr>
         <p:cNvPr id="1" name=""/>
         <p:cNvGrpSpPr/>
         <p:nvPr/>
@@ -4022,21 +5794,7 @@
                   <a:latin typeface="JejuGothicOTF" panose="02000300000000000000" pitchFamily="2" charset="-127"/>
                   <a:ea typeface="JejuGothicOTF" panose="02000300000000000000" pitchFamily="2" charset="-127"/>
                 </a:rPr>
-                <a:t>: </a:t>
-              </a:r>
-              <a:r>
-                <a:rPr lang="en-US" altLang="ko-KR" sz="1300" b="1" dirty="0">
-                  <a:latin typeface="JejuGothicOTF" panose="02000300000000000000" pitchFamily="2" charset="-127"/>
-                  <a:ea typeface="JejuGothicOTF" panose="02000300000000000000" pitchFamily="2" charset="-127"/>
-                </a:rPr>
-                <a:t>https://github.</a:t>
-              </a:r>
-              <a:r>
-                <a:rPr lang="en-US" altLang="ko-KR" sz="1300" b="1">
-                  <a:latin typeface="JejuGothicOTF" panose="02000300000000000000" pitchFamily="2" charset="-127"/>
-                  <a:ea typeface="JejuGothicOTF" panose="02000300000000000000" pitchFamily="2" charset="-127"/>
-                </a:rPr>
-                <a:t>com/sksy930</a:t>
+                <a:t>:</a:t>
               </a:r>
               <a:endParaRPr lang="en-US" altLang="ko-KR" sz="1300" b="1" dirty="0">
                 <a:latin typeface="JejuGothicOTF" panose="02000300000000000000" pitchFamily="2" charset="-127"/>
@@ -4086,6 +5844,457 @@
     <p:extLst>
       <p:ext uri="{BB962C8B-B14F-4D97-AF65-F5344CB8AC3E}">
         <p14:creationId xmlns:p14="http://schemas.microsoft.com/office/powerpoint/2010/main" val="3648392890"/>
+      </p:ext>
+    </p:extLst>
+  </p:cSld>
+  <p:clrMapOvr>
+    <a:masterClrMapping/>
+  </p:clrMapOvr>
+</p:sld>
+</file>
+
+<file path=ppt/slides/slide6.xml><?xml version="1.0" encoding="utf-8"?>
+<p:sld xmlns:a="http://schemas.openxmlformats.org/drawingml/2006/main" xmlns:r="http://schemas.openxmlformats.org/officeDocument/2006/relationships" xmlns:p="http://schemas.openxmlformats.org/presentationml/2006/main">
+  <p:cSld>
+    <p:spTree>
+      <p:nvGrpSpPr>
+        <p:cNvPr id="1" name="">
+          <a:extLst>
+            <a:ext uri="{FF2B5EF4-FFF2-40B4-BE49-F238E27FC236}">
+              <a16:creationId xmlns:a16="http://schemas.microsoft.com/office/drawing/2014/main" id="{BBEC7EA1-4223-876A-7906-3BCEF4B3D073}"/>
+            </a:ext>
+          </a:extLst>
+        </p:cNvPr>
+        <p:cNvGrpSpPr/>
+        <p:nvPr/>
+      </p:nvGrpSpPr>
+      <p:grpSpPr>
+        <a:xfrm>
+          <a:off x="0" y="0"/>
+          <a:ext cx="0" cy="0"/>
+          <a:chOff x="0" y="0"/>
+          <a:chExt cx="0" cy="0"/>
+        </a:xfrm>
+      </p:grpSpPr>
+      <p:sp>
+        <p:nvSpPr>
+          <p:cNvPr id="12" name="사각형: 둥근 모서리 11">
+            <a:extLst>
+              <a:ext uri="{FF2B5EF4-FFF2-40B4-BE49-F238E27FC236}">
+                <a16:creationId xmlns:a16="http://schemas.microsoft.com/office/drawing/2014/main" id="{104BA269-8399-0C58-B282-085E1CE9BF17}"/>
+              </a:ext>
+            </a:extLst>
+          </p:cNvPr>
+          <p:cNvSpPr/>
+          <p:nvPr/>
+        </p:nvSpPr>
+        <p:spPr>
+          <a:xfrm>
+            <a:off x="1803375" y="850790"/>
+            <a:ext cx="8585250" cy="4936692"/>
+          </a:xfrm>
+          <a:prstGeom prst="roundRect">
+            <a:avLst/>
+          </a:prstGeom>
+        </p:spPr>
+        <p:style>
+          <a:lnRef idx="2">
+            <a:schemeClr val="accent1">
+              <a:shade val="50000"/>
+            </a:schemeClr>
+          </a:lnRef>
+          <a:fillRef idx="1">
+            <a:schemeClr val="accent1"/>
+          </a:fillRef>
+          <a:effectRef idx="0">
+            <a:schemeClr val="accent1"/>
+          </a:effectRef>
+          <a:fontRef idx="minor">
+            <a:schemeClr val="lt1"/>
+          </a:fontRef>
+        </p:style>
+        <p:txBody>
+          <a:bodyPr rtlCol="0" anchor="ctr"/>
+          <a:lstStyle/>
+          <a:p>
+            <a:pPr algn="ctr"/>
+            <a:endParaRPr lang="ko-KR" altLang="en-US" b="1" dirty="0"/>
+          </a:p>
+        </p:txBody>
+      </p:sp>
+      <p:grpSp>
+        <p:nvGrpSpPr>
+          <p:cNvPr id="5" name="그룹 4">
+            <a:extLst>
+              <a:ext uri="{FF2B5EF4-FFF2-40B4-BE49-F238E27FC236}">
+                <a16:creationId xmlns:a16="http://schemas.microsoft.com/office/drawing/2014/main" id="{1059002F-8CB5-3C1B-FF36-A62FADD7CFC8}"/>
+              </a:ext>
+            </a:extLst>
+          </p:cNvPr>
+          <p:cNvGrpSpPr/>
+          <p:nvPr/>
+        </p:nvGrpSpPr>
+        <p:grpSpPr>
+          <a:xfrm>
+            <a:off x="3326969" y="2212383"/>
+            <a:ext cx="5603671" cy="2433234"/>
+            <a:chOff x="3326969" y="2212383"/>
+            <a:chExt cx="5603671" cy="2433234"/>
+          </a:xfrm>
+        </p:grpSpPr>
+        <p:grpSp>
+          <p:nvGrpSpPr>
+            <p:cNvPr id="22" name="그룹 21">
+              <a:extLst>
+                <a:ext uri="{FF2B5EF4-FFF2-40B4-BE49-F238E27FC236}">
+                  <a16:creationId xmlns:a16="http://schemas.microsoft.com/office/drawing/2014/main" id="{76839D1F-CC9F-E0D2-79BF-91C2ADCBBC20}"/>
+                </a:ext>
+              </a:extLst>
+            </p:cNvPr>
+            <p:cNvGrpSpPr/>
+            <p:nvPr/>
+          </p:nvGrpSpPr>
+          <p:grpSpPr>
+            <a:xfrm>
+              <a:off x="3326969" y="2212383"/>
+              <a:ext cx="5603671" cy="2433234"/>
+              <a:chOff x="3326969" y="2212383"/>
+              <a:chExt cx="5603671" cy="2433234"/>
+            </a:xfrm>
+          </p:grpSpPr>
+          <p:sp>
+            <p:nvSpPr>
+              <p:cNvPr id="13" name="직사각형 12">
+                <a:extLst>
+                  <a:ext uri="{FF2B5EF4-FFF2-40B4-BE49-F238E27FC236}">
+                    <a16:creationId xmlns:a16="http://schemas.microsoft.com/office/drawing/2014/main" id="{745FB922-2113-55DB-3B0E-72D2DD2E8E9F}"/>
+                  </a:ext>
+                </a:extLst>
+              </p:cNvPr>
+              <p:cNvSpPr/>
+              <p:nvPr/>
+            </p:nvSpPr>
+            <p:spPr>
+              <a:xfrm>
+                <a:off x="3326969" y="2212383"/>
+                <a:ext cx="5603671" cy="2433234"/>
+              </a:xfrm>
+              <a:prstGeom prst="rect">
+                <a:avLst/>
+              </a:prstGeom>
+              <a:solidFill>
+                <a:schemeClr val="bg1"/>
+              </a:solidFill>
+              <a:ln>
+                <a:noFill/>
+              </a:ln>
+            </p:spPr>
+            <p:style>
+              <a:lnRef idx="2">
+                <a:schemeClr val="accent1">
+                  <a:shade val="50000"/>
+                </a:schemeClr>
+              </a:lnRef>
+              <a:fillRef idx="1">
+                <a:schemeClr val="accent1"/>
+              </a:fillRef>
+              <a:effectRef idx="0">
+                <a:schemeClr val="accent1"/>
+              </a:effectRef>
+              <a:fontRef idx="minor">
+                <a:schemeClr val="lt1"/>
+              </a:fontRef>
+            </p:style>
+            <p:txBody>
+              <a:bodyPr rtlCol="0" anchor="ctr"/>
+              <a:lstStyle/>
+              <a:p>
+                <a:pPr algn="ctr"/>
+                <a:endParaRPr lang="ko-KR" altLang="en-US" b="1">
+                  <a:latin typeface="JejuGothicOTF" panose="02000300000000000000" pitchFamily="2" charset="-127"/>
+                  <a:ea typeface="JejuGothicOTF" panose="02000300000000000000" pitchFamily="2" charset="-127"/>
+                </a:endParaRPr>
+              </a:p>
+            </p:txBody>
+          </p:sp>
+          <p:sp>
+            <p:nvSpPr>
+              <p:cNvPr id="15" name="TextBox 14">
+                <a:extLst>
+                  <a:ext uri="{FF2B5EF4-FFF2-40B4-BE49-F238E27FC236}">
+                    <a16:creationId xmlns:a16="http://schemas.microsoft.com/office/drawing/2014/main" id="{8BA1D9BE-3B38-6EB7-C623-DEB3DB9452C3}"/>
+                  </a:ext>
+                </a:extLst>
+              </p:cNvPr>
+              <p:cNvSpPr txBox="1"/>
+              <p:nvPr/>
+            </p:nvSpPr>
+            <p:spPr>
+              <a:xfrm>
+                <a:off x="3495779" y="4024687"/>
+                <a:ext cx="1253869" cy="307777"/>
+              </a:xfrm>
+              <a:prstGeom prst="rect">
+                <a:avLst/>
+              </a:prstGeom>
+              <a:solidFill>
+                <a:schemeClr val="bg1"/>
+              </a:solidFill>
+            </p:spPr>
+            <p:txBody>
+              <a:bodyPr wrap="none" rtlCol="0">
+                <a:spAutoFit/>
+              </a:bodyPr>
+              <a:lstStyle/>
+              <a:p>
+                <a:pPr algn="ctr"/>
+                <a:r>
+                  <a:rPr lang="ko-KR" altLang="en-US" sz="1400" b="1" dirty="0">
+                    <a:latin typeface="JejuGothicOTF" panose="02000300000000000000" pitchFamily="2" charset="-127"/>
+                    <a:ea typeface="JejuGothicOTF" panose="02000300000000000000" pitchFamily="2" charset="-127"/>
+                  </a:rPr>
+                  <a:t>성명 </a:t>
+                </a:r>
+                <a:r>
+                  <a:rPr lang="en-US" altLang="ko-KR" sz="1400" b="1" dirty="0">
+                    <a:latin typeface="JejuGothicOTF" panose="02000300000000000000" pitchFamily="2" charset="-127"/>
+                    <a:ea typeface="JejuGothicOTF" panose="02000300000000000000" pitchFamily="2" charset="-127"/>
+                  </a:rPr>
+                  <a:t>: </a:t>
+                </a:r>
+                <a:r>
+                  <a:rPr lang="ko-KR" altLang="en-US" sz="1400" b="1" dirty="0" err="1">
+                    <a:latin typeface="JejuGothicOTF" panose="02000300000000000000" pitchFamily="2" charset="-127"/>
+                    <a:ea typeface="JejuGothicOTF" panose="02000300000000000000" pitchFamily="2" charset="-127"/>
+                  </a:rPr>
+                  <a:t>최중현</a:t>
+                </a:r>
+                <a:endParaRPr lang="ko-KR" altLang="en-US" sz="1400" b="1" dirty="0">
+                  <a:latin typeface="JejuGothicOTF" panose="02000300000000000000" pitchFamily="2" charset="-127"/>
+                  <a:ea typeface="JejuGothicOTF" panose="02000300000000000000" pitchFamily="2" charset="-127"/>
+                </a:endParaRPr>
+              </a:p>
+            </p:txBody>
+          </p:sp>
+          <p:sp>
+            <p:nvSpPr>
+              <p:cNvPr id="2" name="TextBox 1">
+                <a:extLst>
+                  <a:ext uri="{FF2B5EF4-FFF2-40B4-BE49-F238E27FC236}">
+                    <a16:creationId xmlns:a16="http://schemas.microsoft.com/office/drawing/2014/main" id="{E224651E-12AC-A3B1-5F01-383CF1EE9167}"/>
+                  </a:ext>
+                </a:extLst>
+              </p:cNvPr>
+              <p:cNvSpPr txBox="1"/>
+              <p:nvPr/>
+            </p:nvSpPr>
+            <p:spPr>
+              <a:xfrm>
+                <a:off x="4898140" y="2577981"/>
+                <a:ext cx="4017203" cy="1600438"/>
+              </a:xfrm>
+              <a:prstGeom prst="rect">
+                <a:avLst/>
+              </a:prstGeom>
+              <a:solidFill>
+                <a:schemeClr val="bg1"/>
+              </a:solidFill>
+            </p:spPr>
+            <p:txBody>
+              <a:bodyPr wrap="square" rtlCol="0">
+                <a:spAutoFit/>
+              </a:bodyPr>
+              <a:lstStyle/>
+              <a:p>
+                <a:pPr marL="285750" indent="-285750">
+                  <a:buFont typeface="Arial" panose="020B0604020202020204" pitchFamily="34" charset="0"/>
+                  <a:buChar char="•"/>
+                </a:pPr>
+                <a:r>
+                  <a:rPr lang="ko-KR" altLang="en-US" sz="1400" b="1" dirty="0">
+                    <a:latin typeface="JejuGothicOTF" panose="02000300000000000000" pitchFamily="2" charset="-127"/>
+                    <a:ea typeface="JejuGothicOTF" panose="02000300000000000000" pitchFamily="2" charset="-127"/>
+                  </a:rPr>
+                  <a:t>현      재 </a:t>
+                </a:r>
+                <a:r>
+                  <a:rPr lang="en-US" altLang="ko-KR" sz="1400" b="1" dirty="0">
+                    <a:latin typeface="JejuGothicOTF" panose="02000300000000000000" pitchFamily="2" charset="-127"/>
+                    <a:ea typeface="JejuGothicOTF" panose="02000300000000000000" pitchFamily="2" charset="-127"/>
+                  </a:rPr>
+                  <a:t>: </a:t>
+                </a:r>
+                <a:r>
+                  <a:rPr lang="ko-KR" altLang="en-US" sz="1400" b="1" dirty="0">
+                    <a:latin typeface="JejuGothicOTF" panose="02000300000000000000" pitchFamily="2" charset="-127"/>
+                    <a:ea typeface="JejuGothicOTF" panose="02000300000000000000" pitchFamily="2" charset="-127"/>
+                  </a:rPr>
+                  <a:t>학부과정</a:t>
+                </a:r>
+                <a:endParaRPr lang="en-US" altLang="ko-KR" sz="1400" b="1" dirty="0">
+                  <a:latin typeface="JejuGothicOTF" panose="02000300000000000000" pitchFamily="2" charset="-127"/>
+                  <a:ea typeface="JejuGothicOTF" panose="02000300000000000000" pitchFamily="2" charset="-127"/>
+                </a:endParaRPr>
+              </a:p>
+              <a:p>
+                <a:pPr marL="285750" indent="-285750">
+                  <a:buFont typeface="Arial" panose="020B0604020202020204" pitchFamily="34" charset="0"/>
+                  <a:buChar char="•"/>
+                </a:pPr>
+                <a:endParaRPr lang="en-US" altLang="ko-KR" sz="1400" b="1" dirty="0">
+                  <a:latin typeface="JejuGothicOTF" panose="02000300000000000000" pitchFamily="2" charset="-127"/>
+                  <a:ea typeface="JejuGothicOTF" panose="02000300000000000000" pitchFamily="2" charset="-127"/>
+                </a:endParaRPr>
+              </a:p>
+              <a:p>
+                <a:pPr marL="285750" indent="-285750">
+                  <a:buFont typeface="Arial" panose="020B0604020202020204" pitchFamily="34" charset="0"/>
+                  <a:buChar char="•"/>
+                </a:pPr>
+                <a:r>
+                  <a:rPr lang="ko-KR" altLang="en-US" sz="1400" b="1" dirty="0">
+                    <a:latin typeface="JejuGothicOTF" panose="02000300000000000000" pitchFamily="2" charset="-127"/>
+                    <a:ea typeface="JejuGothicOTF" panose="02000300000000000000" pitchFamily="2" charset="-127"/>
+                  </a:rPr>
+                  <a:t>관심분야 </a:t>
+                </a:r>
+                <a:r>
+                  <a:rPr lang="en-US" altLang="ko-KR" sz="1400" b="1" dirty="0">
+                    <a:latin typeface="JejuGothicOTF" panose="02000300000000000000" pitchFamily="2" charset="-127"/>
+                    <a:ea typeface="JejuGothicOTF" panose="02000300000000000000" pitchFamily="2" charset="-127"/>
+                  </a:rPr>
+                  <a:t>: Natural</a:t>
+                </a:r>
+                <a:r>
+                  <a:rPr lang="ko-KR" altLang="en-US" sz="1400" b="1" dirty="0">
+                    <a:latin typeface="JejuGothicOTF" panose="02000300000000000000" pitchFamily="2" charset="-127"/>
+                    <a:ea typeface="JejuGothicOTF" panose="02000300000000000000" pitchFamily="2" charset="-127"/>
+                  </a:rPr>
+                  <a:t> </a:t>
+                </a:r>
+                <a:r>
+                  <a:rPr lang="en-US" altLang="ko-KR" sz="1400" b="1" dirty="0">
+                    <a:latin typeface="JejuGothicOTF" panose="02000300000000000000" pitchFamily="2" charset="-127"/>
+                    <a:ea typeface="JejuGothicOTF" panose="02000300000000000000" pitchFamily="2" charset="-127"/>
+                  </a:rPr>
+                  <a:t>Language</a:t>
+                </a:r>
+                <a:r>
+                  <a:rPr lang="ko-KR" altLang="en-US" sz="1400" b="1" dirty="0">
+                    <a:latin typeface="JejuGothicOTF" panose="02000300000000000000" pitchFamily="2" charset="-127"/>
+                    <a:ea typeface="JejuGothicOTF" panose="02000300000000000000" pitchFamily="2" charset="-127"/>
+                  </a:rPr>
+                  <a:t> </a:t>
+                </a:r>
+                <a:r>
+                  <a:rPr lang="en-US" altLang="ko-KR" sz="1400" b="1" dirty="0">
+                    <a:latin typeface="JejuGothicOTF" panose="02000300000000000000" pitchFamily="2" charset="-127"/>
+                    <a:ea typeface="JejuGothicOTF" panose="02000300000000000000" pitchFamily="2" charset="-127"/>
+                  </a:rPr>
+                  <a:t>Processing</a:t>
+                </a:r>
+                <a:br>
+                  <a:rPr lang="en-US" altLang="ko-KR" sz="1400" b="1" dirty="0">
+                    <a:latin typeface="JejuGothicOTF" panose="02000300000000000000" pitchFamily="2" charset="-127"/>
+                    <a:ea typeface="JejuGothicOTF" panose="02000300000000000000" pitchFamily="2" charset="-127"/>
+                  </a:rPr>
+                </a:br>
+                <a:endParaRPr lang="en-US" altLang="ko-KR" sz="1400" b="1" dirty="0">
+                  <a:latin typeface="JejuGothicOTF" panose="02000300000000000000" pitchFamily="2" charset="-127"/>
+                  <a:ea typeface="JejuGothicOTF" panose="02000300000000000000" pitchFamily="2" charset="-127"/>
+                </a:endParaRPr>
+              </a:p>
+              <a:p>
+                <a:pPr marL="285750" indent="-285750">
+                  <a:buFont typeface="Arial" panose="020B0604020202020204" pitchFamily="34" charset="0"/>
+                  <a:buChar char="•"/>
+                </a:pPr>
+                <a:r>
+                  <a:rPr lang="en-US" altLang="ko-KR" sz="1400" b="1" dirty="0">
+                    <a:latin typeface="JejuGothicOTF" panose="02000300000000000000" pitchFamily="2" charset="-127"/>
+                    <a:ea typeface="JejuGothicOTF" panose="02000300000000000000" pitchFamily="2" charset="-127"/>
+                  </a:rPr>
+                  <a:t> E-mail  : fourmi103@gmail.com</a:t>
+                </a:r>
+              </a:p>
+              <a:p>
+                <a:pPr marL="285750" indent="-285750">
+                  <a:buFont typeface="Arial" panose="020B0604020202020204" pitchFamily="34" charset="0"/>
+                  <a:buChar char="•"/>
+                </a:pPr>
+                <a:endParaRPr lang="en-US" altLang="ko-KR" sz="1400" b="1" dirty="0">
+                  <a:latin typeface="JejuGothicOTF" panose="02000300000000000000" pitchFamily="2" charset="-127"/>
+                  <a:ea typeface="JejuGothicOTF" panose="02000300000000000000" pitchFamily="2" charset="-127"/>
+                </a:endParaRPr>
+              </a:p>
+              <a:p>
+                <a:pPr marL="285750" indent="-285750">
+                  <a:buFont typeface="Arial" panose="020B0604020202020204" pitchFamily="34" charset="0"/>
+                  <a:buChar char="•"/>
+                </a:pPr>
+                <a:r>
+                  <a:rPr lang="ko-KR" altLang="en-US" sz="1400" b="1" dirty="0">
+                    <a:latin typeface="JejuGothicOTF" panose="02000300000000000000" pitchFamily="2" charset="-127"/>
+                    <a:ea typeface="JejuGothicOTF" panose="02000300000000000000" pitchFamily="2" charset="-127"/>
+                  </a:rPr>
+                  <a:t>홈페이지</a:t>
+                </a:r>
+                <a:r>
+                  <a:rPr lang="en-US" altLang="ko-KR" sz="1400" b="1" dirty="0">
+                    <a:latin typeface="JejuGothicOTF" panose="02000300000000000000" pitchFamily="2" charset="-127"/>
+                    <a:ea typeface="JejuGothicOTF" panose="02000300000000000000" pitchFamily="2" charset="-127"/>
+                  </a:rPr>
+                  <a:t>: </a:t>
+                </a:r>
+                <a:endParaRPr lang="en-US" altLang="ko-KR" sz="1300" b="1" dirty="0">
+                  <a:latin typeface="JejuGothicOTF" panose="02000300000000000000" pitchFamily="2" charset="-127"/>
+                  <a:ea typeface="JejuGothicOTF" panose="02000300000000000000" pitchFamily="2" charset="-127"/>
+                </a:endParaRPr>
+              </a:p>
+            </p:txBody>
+          </p:sp>
+        </p:grpSp>
+        <p:pic>
+          <p:nvPicPr>
+            <p:cNvPr id="4" name="그림 3" descr="인간의 얼굴, 사람, 눈썹, 목이(가) 표시된 사진&#10;&#10;AI 생성 콘텐츠는 정확하지 않을 수 있습니다.">
+              <a:extLst>
+                <a:ext uri="{FF2B5EF4-FFF2-40B4-BE49-F238E27FC236}">
+                  <a16:creationId xmlns:a16="http://schemas.microsoft.com/office/drawing/2014/main" id="{87BC43B7-5D40-BB91-F3B4-9D2FA042065B}"/>
+                </a:ext>
+              </a:extLst>
+            </p:cNvPr>
+            <p:cNvPicPr>
+              <a:picLocks noChangeAspect="1"/>
+            </p:cNvPicPr>
+            <p:nvPr/>
+          </p:nvPicPr>
+          <p:blipFill>
+            <a:blip r:embed="rId2">
+              <a:extLst>
+                <a:ext uri="{28A0092B-C50C-407E-A947-70E740481C1C}">
+                  <a14:useLocalDpi xmlns:a14="http://schemas.microsoft.com/office/drawing/2010/main" val="0"/>
+                </a:ext>
+              </a:extLst>
+            </a:blip>
+            <a:stretch>
+              <a:fillRect/>
+            </a:stretch>
+          </p:blipFill>
+          <p:spPr>
+            <a:xfrm>
+              <a:off x="3483143" y="2406199"/>
+              <a:ext cx="1258824" cy="1618488"/>
+            </a:xfrm>
+            <a:prstGeom prst="rect">
+              <a:avLst/>
+            </a:prstGeom>
+          </p:spPr>
+        </p:pic>
+      </p:grpSp>
+    </p:spTree>
+    <p:extLst>
+      <p:ext uri="{BB962C8B-B14F-4D97-AF65-F5344CB8AC3E}">
+        <p14:creationId xmlns:p14="http://schemas.microsoft.com/office/powerpoint/2010/main" val="1811268248"/>
       </p:ext>
     </p:extLst>
   </p:cSld>

</xml_diff>